<commit_message>
did quick sort comparison- ways to choose pivot
</commit_message>
<xml_diff>
--- a/Analiză comparativă sortări.pptx
+++ b/Analiză comparativă sortări.pptx
@@ -5,20 +5,27 @@
     <p:sldMasterId id="2147483648" r:id="rId1"/>
   </p:sldMasterIdLst>
   <p:notesMasterIdLst>
-    <p:notesMasterId r:id="rId13"/>
+    <p:notesMasterId r:id="rId20"/>
   </p:notesMasterIdLst>
   <p:sldIdLst>
     <p:sldId id="256" r:id="rId2"/>
     <p:sldId id="257" r:id="rId3"/>
     <p:sldId id="261" r:id="rId4"/>
-    <p:sldId id="262" r:id="rId5"/>
-    <p:sldId id="263" r:id="rId6"/>
+    <p:sldId id="263" r:id="rId5"/>
+    <p:sldId id="262" r:id="rId6"/>
     <p:sldId id="264" r:id="rId7"/>
     <p:sldId id="265" r:id="rId8"/>
     <p:sldId id="266" r:id="rId9"/>
-    <p:sldId id="267" r:id="rId10"/>
-    <p:sldId id="268" r:id="rId11"/>
-    <p:sldId id="269" r:id="rId12"/>
+    <p:sldId id="274" r:id="rId10"/>
+    <p:sldId id="267" r:id="rId11"/>
+    <p:sldId id="268" r:id="rId12"/>
+    <p:sldId id="269" r:id="rId13"/>
+    <p:sldId id="275" r:id="rId14"/>
+    <p:sldId id="271" r:id="rId15"/>
+    <p:sldId id="272" r:id="rId16"/>
+    <p:sldId id="273" r:id="rId17"/>
+    <p:sldId id="276" r:id="rId18"/>
+    <p:sldId id="277" r:id="rId19"/>
   </p:sldIdLst>
   <p:sldSz cx="9144000" cy="6858000" type="screen4x3"/>
   <p:notesSz cx="6858000" cy="9144000"/>
@@ -265,6 +272,11 @@
               </c:strCache>
             </c:strRef>
           </c:tx>
+          <c:spPr>
+            <a:solidFill>
+              <a:srgbClr val="FF9900"/>
+            </a:solidFill>
+          </c:spPr>
           <c:cat>
             <c:strRef>
               <c:f>Sheet1!$A$2:$A$5</c:f>
@@ -323,7 +335,7 @@
           </c:tx>
           <c:spPr>
             <a:solidFill>
-              <a:srgbClr val="FF0000"/>
+              <a:srgbClr val="CC0099"/>
             </a:solidFill>
           </c:spPr>
           <c:cat>
@@ -482,6 +494,147 @@
 </file>
 
 <file path=ppt/charts/chart10.xml><?xml version="1.0" encoding="utf-8"?>
+<c:chartSpace xmlns:c="http://schemas.openxmlformats.org/drawingml/2006/chart" xmlns:a="http://schemas.openxmlformats.org/drawingml/2006/main" xmlns:r="http://schemas.openxmlformats.org/officeDocument/2006/relationships">
+  <c:lang val="en-US"/>
+  <c:chart>
+    <c:title>
+      <c:layout/>
+    </c:title>
+    <c:plotArea>
+      <c:layout/>
+      <c:barChart>
+        <c:barDir val="col"/>
+        <c:grouping val="clustered"/>
+        <c:ser>
+          <c:idx val="0"/>
+          <c:order val="0"/>
+          <c:tx>
+            <c:strRef>
+              <c:f>Sheet1!$B$1</c:f>
+              <c:strCache>
+                <c:ptCount val="1"/>
+                <c:pt idx="0">
+                  <c:v>10^7</c:v>
+                </c:pt>
+              </c:strCache>
+            </c:strRef>
+          </c:tx>
+          <c:spPr>
+            <a:solidFill>
+              <a:srgbClr val="00B050"/>
+            </a:solidFill>
+          </c:spPr>
+          <c:cat>
+            <c:strRef>
+              <c:f>Sheet1!$A$2:$A$8</c:f>
+              <c:strCache>
+                <c:ptCount val="7"/>
+                <c:pt idx="0">
+                  <c:v>Default Sort</c:v>
+                </c:pt>
+                <c:pt idx="1">
+                  <c:v>Radix 2^10</c:v>
+                </c:pt>
+                <c:pt idx="2">
+                  <c:v>Radix 2^12 </c:v>
+                </c:pt>
+                <c:pt idx="3">
+                  <c:v>Radix 2^16</c:v>
+                </c:pt>
+                <c:pt idx="4">
+                  <c:v>Merge Sort</c:v>
+                </c:pt>
+                <c:pt idx="5">
+                  <c:v>Quick Sort - pivot random</c:v>
+                </c:pt>
+                <c:pt idx="6">
+                  <c:v>Quick Sort - mediana din 5</c:v>
+                </c:pt>
+              </c:strCache>
+            </c:strRef>
+          </c:cat>
+          <c:val>
+            <c:numRef>
+              <c:f>Sheet1!$B$2:$B$8</c:f>
+              <c:numCache>
+                <c:formatCode>General</c:formatCode>
+                <c:ptCount val="7"/>
+                <c:pt idx="0">
+                  <c:v>3.7157714366912802</c:v>
+                </c:pt>
+                <c:pt idx="1">
+                  <c:v>26.2707934379577</c:v>
+                </c:pt>
+                <c:pt idx="2">
+                  <c:v>40.795489072799597</c:v>
+                </c:pt>
+                <c:pt idx="3">
+                  <c:v>17.465894699096602</c:v>
+                </c:pt>
+                <c:pt idx="4">
+                  <c:v>69.752348423004094</c:v>
+                </c:pt>
+                <c:pt idx="5">
+                  <c:v>53.246130228042603</c:v>
+                </c:pt>
+                <c:pt idx="6">
+                  <c:v>54.015487432479802</c:v>
+                </c:pt>
+              </c:numCache>
+            </c:numRef>
+          </c:val>
+        </c:ser>
+        <c:axId val="76137984"/>
+        <c:axId val="104691968"/>
+      </c:barChart>
+      <c:catAx>
+        <c:axId val="76137984"/>
+        <c:scaling>
+          <c:orientation val="minMax"/>
+        </c:scaling>
+        <c:axPos val="b"/>
+        <c:tickLblPos val="nextTo"/>
+        <c:crossAx val="104691968"/>
+        <c:crosses val="autoZero"/>
+        <c:auto val="1"/>
+        <c:lblAlgn val="ctr"/>
+        <c:lblOffset val="100"/>
+      </c:catAx>
+      <c:valAx>
+        <c:axId val="104691968"/>
+        <c:scaling>
+          <c:orientation val="minMax"/>
+        </c:scaling>
+        <c:axPos val="l"/>
+        <c:majorGridlines/>
+        <c:numFmt formatCode="General" sourceLinked="1"/>
+        <c:tickLblPos val="nextTo"/>
+        <c:crossAx val="76137984"/>
+        <c:crosses val="autoZero"/>
+        <c:crossBetween val="between"/>
+      </c:valAx>
+    </c:plotArea>
+    <c:legend>
+      <c:legendPos val="r"/>
+      <c:layout/>
+    </c:legend>
+    <c:plotVisOnly val="1"/>
+  </c:chart>
+  <c:txPr>
+    <a:bodyPr/>
+    <a:lstStyle/>
+    <a:p>
+      <a:pPr>
+        <a:defRPr sz="1800"/>
+      </a:pPr>
+      <a:endParaRPr lang="en-US"/>
+    </a:p>
+  </c:txPr>
+  <c:externalData r:id="rId1"/>
+</c:chartSpace>
+</file>
+
+<file path=ppt/charts/chart11.xml><?xml version="1.0" encoding="utf-8"?>
 <c:chartSpace xmlns:c="http://schemas.openxmlformats.org/drawingml/2006/chart" xmlns:a="http://schemas.openxmlformats.org/drawingml/2006/main" xmlns:r="http://schemas.openxmlformats.org/officeDocument/2006/relationships">
   <c:lang val="en-US"/>
   <c:chart>
@@ -727,6 +880,1416 @@
 </c:chartSpace>
 </file>
 
+<file path=ppt/charts/chart12.xml><?xml version="1.0" encoding="utf-8"?>
+<c:chartSpace xmlns:c="http://schemas.openxmlformats.org/drawingml/2006/chart" xmlns:a="http://schemas.openxmlformats.org/drawingml/2006/main" xmlns:r="http://schemas.openxmlformats.org/officeDocument/2006/relationships">
+  <c:lang val="en-US"/>
+  <c:chart>
+    <c:plotArea>
+      <c:layout/>
+      <c:barChart>
+        <c:barDir val="col"/>
+        <c:grouping val="clustered"/>
+        <c:ser>
+          <c:idx val="0"/>
+          <c:order val="0"/>
+          <c:tx>
+            <c:strRef>
+              <c:f>Sheet1!$B$1</c:f>
+              <c:strCache>
+                <c:ptCount val="1"/>
+                <c:pt idx="0">
+                  <c:v>10^6 cu max 10^3</c:v>
+                </c:pt>
+              </c:strCache>
+            </c:strRef>
+          </c:tx>
+          <c:spPr>
+            <a:solidFill>
+              <a:srgbClr val="00B050"/>
+            </a:solidFill>
+          </c:spPr>
+          <c:cat>
+            <c:strRef>
+              <c:f>Sheet1!$A$2:$A$5</c:f>
+              <c:strCache>
+                <c:ptCount val="4"/>
+                <c:pt idx="0">
+                  <c:v>Merge Sort </c:v>
+                </c:pt>
+                <c:pt idx="1">
+                  <c:v>Marcin Ciura Gap Seq</c:v>
+                </c:pt>
+                <c:pt idx="2">
+                  <c:v>2^k +1</c:v>
+                </c:pt>
+                <c:pt idx="3">
+                  <c:v>3k+1</c:v>
+                </c:pt>
+              </c:strCache>
+            </c:strRef>
+          </c:cat>
+          <c:val>
+            <c:numRef>
+              <c:f>Sheet1!$B$2:$B$5</c:f>
+              <c:numCache>
+                <c:formatCode>General</c:formatCode>
+                <c:ptCount val="4"/>
+                <c:pt idx="0">
+                  <c:v>4.8947050571441597</c:v>
+                </c:pt>
+                <c:pt idx="1">
+                  <c:v>8.1460378170013392</c:v>
+                </c:pt>
+                <c:pt idx="2">
+                  <c:v>29.661713600158599</c:v>
+                </c:pt>
+                <c:pt idx="3">
+                  <c:v>17.348585128784102</c:v>
+                </c:pt>
+              </c:numCache>
+            </c:numRef>
+          </c:val>
+        </c:ser>
+        <c:ser>
+          <c:idx val="1"/>
+          <c:order val="1"/>
+          <c:tx>
+            <c:strRef>
+              <c:f>Sheet1!$C$1</c:f>
+              <c:strCache>
+                <c:ptCount val="1"/>
+                <c:pt idx="0">
+                  <c:v>10^6 cu max 10^5</c:v>
+                </c:pt>
+              </c:strCache>
+            </c:strRef>
+          </c:tx>
+          <c:cat>
+            <c:strRef>
+              <c:f>Sheet1!$A$2:$A$5</c:f>
+              <c:strCache>
+                <c:ptCount val="4"/>
+                <c:pt idx="0">
+                  <c:v>Merge Sort </c:v>
+                </c:pt>
+                <c:pt idx="1">
+                  <c:v>Marcin Ciura Gap Seq</c:v>
+                </c:pt>
+                <c:pt idx="2">
+                  <c:v>2^k +1</c:v>
+                </c:pt>
+                <c:pt idx="3">
+                  <c:v>3k+1</c:v>
+                </c:pt>
+              </c:strCache>
+            </c:strRef>
+          </c:cat>
+          <c:val>
+            <c:numRef>
+              <c:f>Sheet1!$C$2:$C$5</c:f>
+              <c:numCache>
+                <c:formatCode>General</c:formatCode>
+                <c:ptCount val="4"/>
+                <c:pt idx="0">
+                  <c:v>5.1508500576019198</c:v>
+                </c:pt>
+                <c:pt idx="1">
+                  <c:v>11.9239244461059</c:v>
+                </c:pt>
+                <c:pt idx="2">
+                  <c:v>38.796977996826101</c:v>
+                </c:pt>
+                <c:pt idx="3">
+                  <c:v>28.789175271987901</c:v>
+                </c:pt>
+              </c:numCache>
+            </c:numRef>
+          </c:val>
+        </c:ser>
+        <c:ser>
+          <c:idx val="2"/>
+          <c:order val="2"/>
+          <c:tx>
+            <c:strRef>
+              <c:f>Sheet1!$D$1</c:f>
+              <c:strCache>
+                <c:ptCount val="1"/>
+                <c:pt idx="0">
+                  <c:v>10^6 cu max 10^8</c:v>
+                </c:pt>
+              </c:strCache>
+            </c:strRef>
+          </c:tx>
+          <c:cat>
+            <c:strRef>
+              <c:f>Sheet1!$A$2:$A$5</c:f>
+              <c:strCache>
+                <c:ptCount val="4"/>
+                <c:pt idx="0">
+                  <c:v>Merge Sort </c:v>
+                </c:pt>
+                <c:pt idx="1">
+                  <c:v>Marcin Ciura Gap Seq</c:v>
+                </c:pt>
+                <c:pt idx="2">
+                  <c:v>2^k +1</c:v>
+                </c:pt>
+                <c:pt idx="3">
+                  <c:v>3k+1</c:v>
+                </c:pt>
+              </c:strCache>
+            </c:strRef>
+          </c:cat>
+          <c:val>
+            <c:numRef>
+              <c:f>Sheet1!$D$2:$D$5</c:f>
+              <c:numCache>
+                <c:formatCode>General</c:formatCode>
+                <c:ptCount val="4"/>
+                <c:pt idx="0">
+                  <c:v>5.4712457656860298</c:v>
+                </c:pt>
+                <c:pt idx="1">
+                  <c:v>12.7238481044769</c:v>
+                </c:pt>
+                <c:pt idx="2">
+                  <c:v>40.081913232803302</c:v>
+                </c:pt>
+                <c:pt idx="3">
+                  <c:v>28.692847251892001</c:v>
+                </c:pt>
+              </c:numCache>
+            </c:numRef>
+          </c:val>
+        </c:ser>
+        <c:axId val="163365632"/>
+        <c:axId val="163457280"/>
+      </c:barChart>
+      <c:catAx>
+        <c:axId val="163365632"/>
+        <c:scaling>
+          <c:orientation val="minMax"/>
+        </c:scaling>
+        <c:axPos val="b"/>
+        <c:numFmt formatCode="General" sourceLinked="1"/>
+        <c:tickLblPos val="nextTo"/>
+        <c:crossAx val="163457280"/>
+        <c:crosses val="autoZero"/>
+        <c:auto val="1"/>
+        <c:lblAlgn val="ctr"/>
+        <c:lblOffset val="100"/>
+      </c:catAx>
+      <c:valAx>
+        <c:axId val="163457280"/>
+        <c:scaling>
+          <c:orientation val="minMax"/>
+        </c:scaling>
+        <c:axPos val="l"/>
+        <c:majorGridlines/>
+        <c:numFmt formatCode="General" sourceLinked="1"/>
+        <c:tickLblPos val="nextTo"/>
+        <c:crossAx val="163365632"/>
+        <c:crosses val="autoZero"/>
+        <c:crossBetween val="between"/>
+      </c:valAx>
+    </c:plotArea>
+    <c:legend>
+      <c:legendPos val="r"/>
+      <c:layout/>
+    </c:legend>
+    <c:plotVisOnly val="1"/>
+  </c:chart>
+  <c:txPr>
+    <a:bodyPr/>
+    <a:lstStyle/>
+    <a:p>
+      <a:pPr>
+        <a:defRPr sz="1800"/>
+      </a:pPr>
+      <a:endParaRPr lang="en-US"/>
+    </a:p>
+  </c:txPr>
+  <c:externalData r:id="rId1"/>
+</c:chartSpace>
+</file>
+
+<file path=ppt/charts/chart13.xml><?xml version="1.0" encoding="utf-8"?>
+<c:chartSpace xmlns:c="http://schemas.openxmlformats.org/drawingml/2006/chart" xmlns:a="http://schemas.openxmlformats.org/drawingml/2006/main" xmlns:r="http://schemas.openxmlformats.org/officeDocument/2006/relationships">
+  <c:lang val="en-US"/>
+  <c:chart>
+    <c:plotArea>
+      <c:layout/>
+      <c:barChart>
+        <c:barDir val="col"/>
+        <c:grouping val="clustered"/>
+        <c:ser>
+          <c:idx val="0"/>
+          <c:order val="0"/>
+          <c:tx>
+            <c:strRef>
+              <c:f>Sheet1!$B$1</c:f>
+              <c:strCache>
+                <c:ptCount val="1"/>
+                <c:pt idx="0">
+                  <c:v>10^7 cu max 10^3</c:v>
+                </c:pt>
+              </c:strCache>
+            </c:strRef>
+          </c:tx>
+          <c:spPr>
+            <a:solidFill>
+              <a:srgbClr val="00B050"/>
+            </a:solidFill>
+          </c:spPr>
+          <c:cat>
+            <c:strRef>
+              <c:f>Sheet1!$A$2:$A$5</c:f>
+              <c:strCache>
+                <c:ptCount val="4"/>
+                <c:pt idx="0">
+                  <c:v>Merge Sort </c:v>
+                </c:pt>
+                <c:pt idx="1">
+                  <c:v>Marcin Ciura Gap Seq</c:v>
+                </c:pt>
+                <c:pt idx="2">
+                  <c:v>2^k +1</c:v>
+                </c:pt>
+                <c:pt idx="3">
+                  <c:v>3k+1</c:v>
+                </c:pt>
+              </c:strCache>
+            </c:strRef>
+          </c:cat>
+          <c:val>
+            <c:numRef>
+              <c:f>Sheet1!$B$2:$B$5</c:f>
+              <c:numCache>
+                <c:formatCode>General</c:formatCode>
+                <c:ptCount val="4"/>
+                <c:pt idx="0">
+                  <c:v>62.259561300277703</c:v>
+                </c:pt>
+                <c:pt idx="1">
+                  <c:v>124.840999364852</c:v>
+                </c:pt>
+                <c:pt idx="2">
+                  <c:v>388.72851419448801</c:v>
+                </c:pt>
+                <c:pt idx="3">
+                  <c:v>293.49203252792302</c:v>
+                </c:pt>
+              </c:numCache>
+            </c:numRef>
+          </c:val>
+        </c:ser>
+        <c:ser>
+          <c:idx val="1"/>
+          <c:order val="1"/>
+          <c:tx>
+            <c:strRef>
+              <c:f>Sheet1!$C$1</c:f>
+              <c:strCache>
+                <c:ptCount val="1"/>
+                <c:pt idx="0">
+                  <c:v>10^7 cu max 10^5</c:v>
+                </c:pt>
+              </c:strCache>
+            </c:strRef>
+          </c:tx>
+          <c:cat>
+            <c:strRef>
+              <c:f>Sheet1!$A$2:$A$5</c:f>
+              <c:strCache>
+                <c:ptCount val="4"/>
+                <c:pt idx="0">
+                  <c:v>Merge Sort </c:v>
+                </c:pt>
+                <c:pt idx="1">
+                  <c:v>Marcin Ciura Gap Seq</c:v>
+                </c:pt>
+                <c:pt idx="2">
+                  <c:v>2^k +1</c:v>
+                </c:pt>
+                <c:pt idx="3">
+                  <c:v>3k+1</c:v>
+                </c:pt>
+              </c:strCache>
+            </c:strRef>
+          </c:cat>
+          <c:val>
+            <c:numRef>
+              <c:f>Sheet1!$C$2:$C$5</c:f>
+              <c:numCache>
+                <c:formatCode>General</c:formatCode>
+                <c:ptCount val="4"/>
+                <c:pt idx="0">
+                  <c:v>64.513422727584796</c:v>
+                </c:pt>
+                <c:pt idx="1">
+                  <c:v>166.09339427947901</c:v>
+                </c:pt>
+                <c:pt idx="2">
+                  <c:v>664.74731278419495</c:v>
+                </c:pt>
+                <c:pt idx="3">
+                  <c:v>543.32401347160305</c:v>
+                </c:pt>
+              </c:numCache>
+            </c:numRef>
+          </c:val>
+        </c:ser>
+        <c:ser>
+          <c:idx val="2"/>
+          <c:order val="2"/>
+          <c:tx>
+            <c:strRef>
+              <c:f>Sheet1!$D$1</c:f>
+              <c:strCache>
+                <c:ptCount val="1"/>
+                <c:pt idx="0">
+                  <c:v>10^7 cu max 10^8</c:v>
+                </c:pt>
+              </c:strCache>
+            </c:strRef>
+          </c:tx>
+          <c:cat>
+            <c:strRef>
+              <c:f>Sheet1!$A$2:$A$5</c:f>
+              <c:strCache>
+                <c:ptCount val="4"/>
+                <c:pt idx="0">
+                  <c:v>Merge Sort </c:v>
+                </c:pt>
+                <c:pt idx="1">
+                  <c:v>Marcin Ciura Gap Seq</c:v>
+                </c:pt>
+                <c:pt idx="2">
+                  <c:v>2^k +1</c:v>
+                </c:pt>
+                <c:pt idx="3">
+                  <c:v>3k+1</c:v>
+                </c:pt>
+              </c:strCache>
+            </c:strRef>
+          </c:cat>
+          <c:val>
+            <c:numRef>
+              <c:f>Sheet1!$D$2:$D$5</c:f>
+              <c:numCache>
+                <c:formatCode>General</c:formatCode>
+                <c:ptCount val="4"/>
+                <c:pt idx="0">
+                  <c:v>67.926062345504704</c:v>
+                </c:pt>
+                <c:pt idx="1">
+                  <c:v>196.19719576835601</c:v>
+                </c:pt>
+                <c:pt idx="2">
+                  <c:v>753.30929565429597</c:v>
+                </c:pt>
+                <c:pt idx="3">
+                  <c:v>617.21393322944596</c:v>
+                </c:pt>
+              </c:numCache>
+            </c:numRef>
+          </c:val>
+        </c:ser>
+        <c:axId val="163943936"/>
+        <c:axId val="163968512"/>
+      </c:barChart>
+      <c:catAx>
+        <c:axId val="163943936"/>
+        <c:scaling>
+          <c:orientation val="minMax"/>
+        </c:scaling>
+        <c:axPos val="b"/>
+        <c:numFmt formatCode="General" sourceLinked="1"/>
+        <c:tickLblPos val="nextTo"/>
+        <c:crossAx val="163968512"/>
+        <c:crosses val="autoZero"/>
+        <c:auto val="1"/>
+        <c:lblAlgn val="ctr"/>
+        <c:lblOffset val="100"/>
+      </c:catAx>
+      <c:valAx>
+        <c:axId val="163968512"/>
+        <c:scaling>
+          <c:orientation val="minMax"/>
+        </c:scaling>
+        <c:axPos val="l"/>
+        <c:majorGridlines/>
+        <c:numFmt formatCode="General" sourceLinked="1"/>
+        <c:tickLblPos val="nextTo"/>
+        <c:crossAx val="163943936"/>
+        <c:crosses val="autoZero"/>
+        <c:crossBetween val="between"/>
+      </c:valAx>
+    </c:plotArea>
+    <c:legend>
+      <c:legendPos val="r"/>
+      <c:layout/>
+    </c:legend>
+    <c:plotVisOnly val="1"/>
+  </c:chart>
+  <c:txPr>
+    <a:bodyPr/>
+    <a:lstStyle/>
+    <a:p>
+      <a:pPr>
+        <a:defRPr sz="1800"/>
+      </a:pPr>
+      <a:endParaRPr lang="en-US"/>
+    </a:p>
+  </c:txPr>
+  <c:externalData r:id="rId1"/>
+</c:chartSpace>
+</file>
+
+<file path=ppt/charts/chart14.xml><?xml version="1.0" encoding="utf-8"?>
+<c:chartSpace xmlns:c="http://schemas.openxmlformats.org/drawingml/2006/chart" xmlns:a="http://schemas.openxmlformats.org/drawingml/2006/main" xmlns:r="http://schemas.openxmlformats.org/officeDocument/2006/relationships">
+  <c:lang val="en-US"/>
+  <c:chart>
+    <c:plotArea>
+      <c:layout/>
+      <c:barChart>
+        <c:barDir val="col"/>
+        <c:grouping val="clustered"/>
+        <c:ser>
+          <c:idx val="0"/>
+          <c:order val="0"/>
+          <c:tx>
+            <c:strRef>
+              <c:f>Sheet1!$D$1</c:f>
+              <c:strCache>
+                <c:ptCount val="1"/>
+                <c:pt idx="0">
+                  <c:v>10^6 cu max 10^8</c:v>
+                </c:pt>
+              </c:strCache>
+            </c:strRef>
+          </c:tx>
+          <c:spPr>
+            <a:solidFill>
+              <a:srgbClr val="00B050"/>
+            </a:solidFill>
+          </c:spPr>
+          <c:cat>
+            <c:strRef>
+              <c:f>Sheet1!$A$2:$A$5</c:f>
+              <c:strCache>
+                <c:ptCount val="4"/>
+                <c:pt idx="0">
+                  <c:v>Merge Sort </c:v>
+                </c:pt>
+                <c:pt idx="1">
+                  <c:v>Marcin Ciura Gap Seq</c:v>
+                </c:pt>
+                <c:pt idx="2">
+                  <c:v>2^k +1</c:v>
+                </c:pt>
+                <c:pt idx="3">
+                  <c:v>3k+1</c:v>
+                </c:pt>
+              </c:strCache>
+            </c:strRef>
+          </c:cat>
+          <c:val>
+            <c:numRef>
+              <c:f>Sheet1!$D$2:$D$5</c:f>
+              <c:numCache>
+                <c:formatCode>General</c:formatCode>
+                <c:ptCount val="4"/>
+                <c:pt idx="0">
+                  <c:v>5.4712457656860298</c:v>
+                </c:pt>
+                <c:pt idx="1">
+                  <c:v>12.7238481044769</c:v>
+                </c:pt>
+                <c:pt idx="2">
+                  <c:v>40.081913232803302</c:v>
+                </c:pt>
+                <c:pt idx="3">
+                  <c:v>28.692847251892001</c:v>
+                </c:pt>
+              </c:numCache>
+            </c:numRef>
+          </c:val>
+        </c:ser>
+        <c:ser>
+          <c:idx val="1"/>
+          <c:order val="1"/>
+          <c:tx>
+            <c:strRef>
+              <c:f>Sheet1!$E$1</c:f>
+              <c:strCache>
+                <c:ptCount val="1"/>
+                <c:pt idx="0">
+                  <c:v>10^7 cu max 10^8</c:v>
+                </c:pt>
+              </c:strCache>
+            </c:strRef>
+          </c:tx>
+          <c:cat>
+            <c:strRef>
+              <c:f>Sheet1!$A$2:$A$5</c:f>
+              <c:strCache>
+                <c:ptCount val="4"/>
+                <c:pt idx="0">
+                  <c:v>Merge Sort </c:v>
+                </c:pt>
+                <c:pt idx="1">
+                  <c:v>Marcin Ciura Gap Seq</c:v>
+                </c:pt>
+                <c:pt idx="2">
+                  <c:v>2^k +1</c:v>
+                </c:pt>
+                <c:pt idx="3">
+                  <c:v>3k+1</c:v>
+                </c:pt>
+              </c:strCache>
+            </c:strRef>
+          </c:cat>
+          <c:val>
+            <c:numRef>
+              <c:f>Sheet1!$E$2:$E$5</c:f>
+              <c:numCache>
+                <c:formatCode>General</c:formatCode>
+                <c:ptCount val="4"/>
+                <c:pt idx="0">
+                  <c:v>67.926062345504704</c:v>
+                </c:pt>
+                <c:pt idx="1">
+                  <c:v>196.19719576835601</c:v>
+                </c:pt>
+                <c:pt idx="2">
+                  <c:v>753.30929565429597</c:v>
+                </c:pt>
+                <c:pt idx="3">
+                  <c:v>617.21393322944596</c:v>
+                </c:pt>
+              </c:numCache>
+            </c:numRef>
+          </c:val>
+        </c:ser>
+        <c:axId val="164208640"/>
+        <c:axId val="164210944"/>
+      </c:barChart>
+      <c:catAx>
+        <c:axId val="164208640"/>
+        <c:scaling>
+          <c:orientation val="minMax"/>
+        </c:scaling>
+        <c:axPos val="b"/>
+        <c:numFmt formatCode="General" sourceLinked="1"/>
+        <c:tickLblPos val="nextTo"/>
+        <c:crossAx val="164210944"/>
+        <c:crosses val="autoZero"/>
+        <c:auto val="1"/>
+        <c:lblAlgn val="ctr"/>
+        <c:lblOffset val="100"/>
+      </c:catAx>
+      <c:valAx>
+        <c:axId val="164210944"/>
+        <c:scaling>
+          <c:orientation val="minMax"/>
+        </c:scaling>
+        <c:axPos val="l"/>
+        <c:majorGridlines/>
+        <c:numFmt formatCode="General" sourceLinked="1"/>
+        <c:tickLblPos val="nextTo"/>
+        <c:crossAx val="164208640"/>
+        <c:crosses val="autoZero"/>
+        <c:crossBetween val="between"/>
+      </c:valAx>
+    </c:plotArea>
+    <c:legend>
+      <c:legendPos val="r"/>
+      <c:layout/>
+    </c:legend>
+    <c:plotVisOnly val="1"/>
+  </c:chart>
+  <c:txPr>
+    <a:bodyPr/>
+    <a:lstStyle/>
+    <a:p>
+      <a:pPr>
+        <a:defRPr sz="1800"/>
+      </a:pPr>
+      <a:endParaRPr lang="en-US"/>
+    </a:p>
+  </c:txPr>
+  <c:externalData r:id="rId1"/>
+</c:chartSpace>
+</file>
+
+<file path=ppt/charts/chart15.xml><?xml version="1.0" encoding="utf-8"?>
+<c:chartSpace xmlns:c="http://schemas.openxmlformats.org/drawingml/2006/chart" xmlns:a="http://schemas.openxmlformats.org/drawingml/2006/main" xmlns:r="http://schemas.openxmlformats.org/officeDocument/2006/relationships">
+  <c:lang val="en-US"/>
+  <c:style val="26"/>
+  <c:chart>
+    <c:plotArea>
+      <c:layout/>
+      <c:lineChart>
+        <c:grouping val="standard"/>
+        <c:ser>
+          <c:idx val="0"/>
+          <c:order val="0"/>
+          <c:tx>
+            <c:strRef>
+              <c:f>Sheet1!$A$2</c:f>
+              <c:strCache>
+                <c:ptCount val="1"/>
+                <c:pt idx="0">
+                  <c:v>Merge Sort </c:v>
+                </c:pt>
+              </c:strCache>
+            </c:strRef>
+          </c:tx>
+          <c:marker>
+            <c:symbol val="none"/>
+          </c:marker>
+          <c:cat>
+            <c:strRef>
+              <c:f>Sheet1!$B$1:$E$1</c:f>
+              <c:strCache>
+                <c:ptCount val="4"/>
+                <c:pt idx="0">
+                  <c:v>10^4 </c:v>
+                </c:pt>
+                <c:pt idx="1">
+                  <c:v>10^5 </c:v>
+                </c:pt>
+                <c:pt idx="2">
+                  <c:v>10^6 </c:v>
+                </c:pt>
+                <c:pt idx="3">
+                  <c:v>10^7 </c:v>
+                </c:pt>
+              </c:strCache>
+            </c:strRef>
+          </c:cat>
+          <c:val>
+            <c:numRef>
+              <c:f>Sheet1!$B$2:$E$2</c:f>
+              <c:numCache>
+                <c:formatCode>General</c:formatCode>
+                <c:ptCount val="4"/>
+                <c:pt idx="0">
+                  <c:v>3.7134885787963798E-2</c:v>
+                </c:pt>
+                <c:pt idx="1">
+                  <c:v>0.39491891860961897</c:v>
+                </c:pt>
+                <c:pt idx="2">
+                  <c:v>5.4712457656860298</c:v>
+                </c:pt>
+                <c:pt idx="3">
+                  <c:v>67.926062345504704</c:v>
+                </c:pt>
+              </c:numCache>
+            </c:numRef>
+          </c:val>
+        </c:ser>
+        <c:ser>
+          <c:idx val="1"/>
+          <c:order val="1"/>
+          <c:tx>
+            <c:strRef>
+              <c:f>Sheet1!$A$3</c:f>
+              <c:strCache>
+                <c:ptCount val="1"/>
+                <c:pt idx="0">
+                  <c:v>Marcin Ciura Gap Seq</c:v>
+                </c:pt>
+              </c:strCache>
+            </c:strRef>
+          </c:tx>
+          <c:marker>
+            <c:symbol val="none"/>
+          </c:marker>
+          <c:cat>
+            <c:strRef>
+              <c:f>Sheet1!$B$1:$E$1</c:f>
+              <c:strCache>
+                <c:ptCount val="4"/>
+                <c:pt idx="0">
+                  <c:v>10^4 </c:v>
+                </c:pt>
+                <c:pt idx="1">
+                  <c:v>10^5 </c:v>
+                </c:pt>
+                <c:pt idx="2">
+                  <c:v>10^6 </c:v>
+                </c:pt>
+                <c:pt idx="3">
+                  <c:v>10^7 </c:v>
+                </c:pt>
+              </c:strCache>
+            </c:strRef>
+          </c:cat>
+          <c:val>
+            <c:numRef>
+              <c:f>Sheet1!$B$3:$E$3</c:f>
+              <c:numCache>
+                <c:formatCode>General</c:formatCode>
+                <c:ptCount val="4"/>
+                <c:pt idx="0">
+                  <c:v>8.3211660385131794E-2</c:v>
+                </c:pt>
+                <c:pt idx="1">
+                  <c:v>1.0006103515625</c:v>
+                </c:pt>
+                <c:pt idx="2">
+                  <c:v>12.7238481044769</c:v>
+                </c:pt>
+                <c:pt idx="3">
+                  <c:v>196.19719576835601</c:v>
+                </c:pt>
+              </c:numCache>
+            </c:numRef>
+          </c:val>
+        </c:ser>
+        <c:ser>
+          <c:idx val="2"/>
+          <c:order val="2"/>
+          <c:tx>
+            <c:strRef>
+              <c:f>Sheet1!$A$4</c:f>
+              <c:strCache>
+                <c:ptCount val="1"/>
+                <c:pt idx="0">
+                  <c:v>2^k +1</c:v>
+                </c:pt>
+              </c:strCache>
+            </c:strRef>
+          </c:tx>
+          <c:marker>
+            <c:symbol val="none"/>
+          </c:marker>
+          <c:cat>
+            <c:strRef>
+              <c:f>Sheet1!$B$1:$E$1</c:f>
+              <c:strCache>
+                <c:ptCount val="4"/>
+                <c:pt idx="0">
+                  <c:v>10^4 </c:v>
+                </c:pt>
+                <c:pt idx="1">
+                  <c:v>10^5 </c:v>
+                </c:pt>
+                <c:pt idx="2">
+                  <c:v>10^6 </c:v>
+                </c:pt>
+                <c:pt idx="3">
+                  <c:v>10^7 </c:v>
+                </c:pt>
+              </c:strCache>
+            </c:strRef>
+          </c:cat>
+          <c:val>
+            <c:numRef>
+              <c:f>Sheet1!$B$4:$E$4</c:f>
+              <c:numCache>
+                <c:formatCode>General</c:formatCode>
+                <c:ptCount val="4"/>
+                <c:pt idx="0">
+                  <c:v>0.34738183021545399</c:v>
+                </c:pt>
+                <c:pt idx="1">
+                  <c:v>3.58803009986877</c:v>
+                </c:pt>
+                <c:pt idx="2">
+                  <c:v>40.081913232803302</c:v>
+                </c:pt>
+                <c:pt idx="3">
+                  <c:v>753.30929565429597</c:v>
+                </c:pt>
+              </c:numCache>
+            </c:numRef>
+          </c:val>
+        </c:ser>
+        <c:ser>
+          <c:idx val="3"/>
+          <c:order val="3"/>
+          <c:tx>
+            <c:strRef>
+              <c:f>Sheet1!$A$5</c:f>
+              <c:strCache>
+                <c:ptCount val="1"/>
+                <c:pt idx="0">
+                  <c:v>3k+1</c:v>
+                </c:pt>
+              </c:strCache>
+            </c:strRef>
+          </c:tx>
+          <c:marker>
+            <c:symbol val="none"/>
+          </c:marker>
+          <c:cat>
+            <c:strRef>
+              <c:f>Sheet1!$B$1:$E$1</c:f>
+              <c:strCache>
+                <c:ptCount val="4"/>
+                <c:pt idx="0">
+                  <c:v>10^4 </c:v>
+                </c:pt>
+                <c:pt idx="1">
+                  <c:v>10^5 </c:v>
+                </c:pt>
+                <c:pt idx="2">
+                  <c:v>10^6 </c:v>
+                </c:pt>
+                <c:pt idx="3">
+                  <c:v>10^7 </c:v>
+                </c:pt>
+              </c:strCache>
+            </c:strRef>
+          </c:cat>
+          <c:val>
+            <c:numRef>
+              <c:f>Sheet1!$B$5:$E$5</c:f>
+              <c:numCache>
+                <c:formatCode>General</c:formatCode>
+                <c:ptCount val="4"/>
+                <c:pt idx="0">
+                  <c:v>0.115782260894775</c:v>
+                </c:pt>
+                <c:pt idx="1">
+                  <c:v>1.6467988491058301</c:v>
+                </c:pt>
+                <c:pt idx="2">
+                  <c:v>28.692847251892001</c:v>
+                </c:pt>
+                <c:pt idx="3">
+                  <c:v>617.21393322944596</c:v>
+                </c:pt>
+              </c:numCache>
+            </c:numRef>
+          </c:val>
+        </c:ser>
+        <c:marker val="1"/>
+        <c:axId val="164552064"/>
+        <c:axId val="164828288"/>
+      </c:lineChart>
+      <c:catAx>
+        <c:axId val="164552064"/>
+        <c:scaling>
+          <c:orientation val="minMax"/>
+        </c:scaling>
+        <c:axPos val="b"/>
+        <c:numFmt formatCode="General" sourceLinked="1"/>
+        <c:tickLblPos val="nextTo"/>
+        <c:crossAx val="164828288"/>
+        <c:crosses val="autoZero"/>
+        <c:auto val="1"/>
+        <c:lblAlgn val="ctr"/>
+        <c:lblOffset val="100"/>
+      </c:catAx>
+      <c:valAx>
+        <c:axId val="164828288"/>
+        <c:scaling>
+          <c:orientation val="minMax"/>
+        </c:scaling>
+        <c:axPos val="l"/>
+        <c:majorGridlines/>
+        <c:numFmt formatCode="General" sourceLinked="1"/>
+        <c:tickLblPos val="nextTo"/>
+        <c:crossAx val="164552064"/>
+        <c:crosses val="autoZero"/>
+        <c:crossBetween val="between"/>
+      </c:valAx>
+    </c:plotArea>
+    <c:legend>
+      <c:legendPos val="r"/>
+      <c:layout/>
+    </c:legend>
+    <c:plotVisOnly val="1"/>
+    <c:dispBlanksAs val="zero"/>
+  </c:chart>
+  <c:txPr>
+    <a:bodyPr/>
+    <a:lstStyle/>
+    <a:p>
+      <a:pPr>
+        <a:defRPr sz="1800"/>
+      </a:pPr>
+      <a:endParaRPr lang="en-US"/>
+    </a:p>
+  </c:txPr>
+  <c:externalData r:id="rId1"/>
+</c:chartSpace>
+</file>
+
+<file path=ppt/charts/chart16.xml><?xml version="1.0" encoding="utf-8"?>
+<c:chartSpace xmlns:c="http://schemas.openxmlformats.org/drawingml/2006/chart" xmlns:a="http://schemas.openxmlformats.org/drawingml/2006/main" xmlns:r="http://schemas.openxmlformats.org/officeDocument/2006/relationships">
+  <c:lang val="en-US"/>
+  <c:chart>
+    <c:plotArea>
+      <c:layout/>
+      <c:barChart>
+        <c:barDir val="col"/>
+        <c:grouping val="clustered"/>
+        <c:ser>
+          <c:idx val="0"/>
+          <c:order val="0"/>
+          <c:tx>
+            <c:strRef>
+              <c:f>Sheet1!$B$1</c:f>
+              <c:strCache>
+                <c:ptCount val="1"/>
+                <c:pt idx="0">
+                  <c:v>10^4 </c:v>
+                </c:pt>
+              </c:strCache>
+            </c:strRef>
+          </c:tx>
+          <c:cat>
+            <c:strRef>
+              <c:f>Sheet1!$A$2:$A$5</c:f>
+              <c:strCache>
+                <c:ptCount val="4"/>
+                <c:pt idx="0">
+                  <c:v>Merge Sort </c:v>
+                </c:pt>
+                <c:pt idx="1">
+                  <c:v>Quick Sort - pivot random</c:v>
+                </c:pt>
+                <c:pt idx="2">
+                  <c:v>Quick Sort - mediana din 5 </c:v>
+                </c:pt>
+                <c:pt idx="3">
+                  <c:v>Quick Sort - mediana medianelor </c:v>
+                </c:pt>
+              </c:strCache>
+            </c:strRef>
+          </c:cat>
+          <c:val>
+            <c:numRef>
+              <c:f>Sheet1!$B$2:$B$5</c:f>
+              <c:numCache>
+                <c:formatCode>General</c:formatCode>
+                <c:ptCount val="4"/>
+                <c:pt idx="0">
+                  <c:v>3.1235694885253899E-2</c:v>
+                </c:pt>
+                <c:pt idx="1">
+                  <c:v>5.1675081253051702E-2</c:v>
+                </c:pt>
+                <c:pt idx="2">
+                  <c:v>1.99096202850341E-2</c:v>
+                </c:pt>
+                <c:pt idx="3">
+                  <c:v>6.0428619384765597E-2</c:v>
+                </c:pt>
+              </c:numCache>
+            </c:numRef>
+          </c:val>
+        </c:ser>
+        <c:ser>
+          <c:idx val="1"/>
+          <c:order val="1"/>
+          <c:tx>
+            <c:strRef>
+              <c:f>Sheet1!$C$1</c:f>
+              <c:strCache>
+                <c:ptCount val="1"/>
+                <c:pt idx="0">
+                  <c:v>10^5 </c:v>
+                </c:pt>
+              </c:strCache>
+            </c:strRef>
+          </c:tx>
+          <c:cat>
+            <c:strRef>
+              <c:f>Sheet1!$A$2:$A$5</c:f>
+              <c:strCache>
+                <c:ptCount val="4"/>
+                <c:pt idx="0">
+                  <c:v>Merge Sort </c:v>
+                </c:pt>
+                <c:pt idx="1">
+                  <c:v>Quick Sort - pivot random</c:v>
+                </c:pt>
+                <c:pt idx="2">
+                  <c:v>Quick Sort - mediana din 5 </c:v>
+                </c:pt>
+                <c:pt idx="3">
+                  <c:v>Quick Sort - mediana medianelor </c:v>
+                </c:pt>
+              </c:strCache>
+            </c:strRef>
+          </c:cat>
+          <c:val>
+            <c:numRef>
+              <c:f>Sheet1!$C$2:$C$5</c:f>
+              <c:numCache>
+                <c:formatCode>General</c:formatCode>
+                <c:ptCount val="4"/>
+                <c:pt idx="0">
+                  <c:v>0.40695381164550698</c:v>
+                </c:pt>
+                <c:pt idx="1">
+                  <c:v>0.40901851654052701</c:v>
+                </c:pt>
+                <c:pt idx="2">
+                  <c:v>0.42115545272827098</c:v>
+                </c:pt>
+                <c:pt idx="3">
+                  <c:v>0.416383266448974</c:v>
+                </c:pt>
+              </c:numCache>
+            </c:numRef>
+          </c:val>
+        </c:ser>
+        <c:ser>
+          <c:idx val="2"/>
+          <c:order val="2"/>
+          <c:tx>
+            <c:strRef>
+              <c:f>Sheet1!$D$1</c:f>
+              <c:strCache>
+                <c:ptCount val="1"/>
+                <c:pt idx="0">
+                  <c:v>10^6 </c:v>
+                </c:pt>
+              </c:strCache>
+            </c:strRef>
+          </c:tx>
+          <c:cat>
+            <c:strRef>
+              <c:f>Sheet1!$A$2:$A$5</c:f>
+              <c:strCache>
+                <c:ptCount val="4"/>
+                <c:pt idx="0">
+                  <c:v>Merge Sort </c:v>
+                </c:pt>
+                <c:pt idx="1">
+                  <c:v>Quick Sort - pivot random</c:v>
+                </c:pt>
+                <c:pt idx="2">
+                  <c:v>Quick Sort - mediana din 5 </c:v>
+                </c:pt>
+                <c:pt idx="3">
+                  <c:v>Quick Sort - mediana medianelor </c:v>
+                </c:pt>
+              </c:strCache>
+            </c:strRef>
+          </c:cat>
+          <c:val>
+            <c:numRef>
+              <c:f>Sheet1!$D$2:$D$5</c:f>
+              <c:numCache>
+                <c:formatCode>General</c:formatCode>
+                <c:ptCount val="4"/>
+                <c:pt idx="0">
+                  <c:v>5.3245885372161803</c:v>
+                </c:pt>
+                <c:pt idx="1">
+                  <c:v>4.0354080200195304</c:v>
+                </c:pt>
+                <c:pt idx="2">
+                  <c:v>4.0295815467834402</c:v>
+                </c:pt>
+                <c:pt idx="3">
+                  <c:v>4.10546875</c:v>
+                </c:pt>
+              </c:numCache>
+            </c:numRef>
+          </c:val>
+        </c:ser>
+        <c:axId val="165758848"/>
+        <c:axId val="165775616"/>
+      </c:barChart>
+      <c:catAx>
+        <c:axId val="165758848"/>
+        <c:scaling>
+          <c:orientation val="minMax"/>
+        </c:scaling>
+        <c:axPos val="b"/>
+        <c:numFmt formatCode="General" sourceLinked="1"/>
+        <c:tickLblPos val="nextTo"/>
+        <c:crossAx val="165775616"/>
+        <c:crosses val="autoZero"/>
+        <c:auto val="1"/>
+        <c:lblAlgn val="ctr"/>
+        <c:lblOffset val="100"/>
+      </c:catAx>
+      <c:valAx>
+        <c:axId val="165775616"/>
+        <c:scaling>
+          <c:orientation val="minMax"/>
+        </c:scaling>
+        <c:axPos val="l"/>
+        <c:majorGridlines/>
+        <c:numFmt formatCode="General" sourceLinked="1"/>
+        <c:tickLblPos val="nextTo"/>
+        <c:crossAx val="165758848"/>
+        <c:crosses val="autoZero"/>
+        <c:crossBetween val="between"/>
+      </c:valAx>
+    </c:plotArea>
+    <c:legend>
+      <c:legendPos val="r"/>
+      <c:layout/>
+    </c:legend>
+    <c:plotVisOnly val="1"/>
+    <c:dispBlanksAs val="zero"/>
+  </c:chart>
+  <c:txPr>
+    <a:bodyPr/>
+    <a:lstStyle/>
+    <a:p>
+      <a:pPr>
+        <a:defRPr sz="1800"/>
+      </a:pPr>
+      <a:endParaRPr lang="en-US"/>
+    </a:p>
+  </c:txPr>
+  <c:externalData r:id="rId1"/>
+</c:chartSpace>
+</file>
+
+<file path=ppt/charts/chart17.xml><?xml version="1.0" encoding="utf-8"?>
+<c:chartSpace xmlns:c="http://schemas.openxmlformats.org/drawingml/2006/chart" xmlns:a="http://schemas.openxmlformats.org/drawingml/2006/main" xmlns:r="http://schemas.openxmlformats.org/officeDocument/2006/relationships">
+  <c:lang val="en-US"/>
+  <c:chart>
+    <c:title>
+      <c:layout/>
+    </c:title>
+    <c:plotArea>
+      <c:layout/>
+      <c:barChart>
+        <c:barDir val="col"/>
+        <c:grouping val="clustered"/>
+        <c:ser>
+          <c:idx val="0"/>
+          <c:order val="0"/>
+          <c:tx>
+            <c:strRef>
+              <c:f>Sheet1!$B$1</c:f>
+              <c:strCache>
+                <c:ptCount val="1"/>
+                <c:pt idx="0">
+                  <c:v>10^4 </c:v>
+                </c:pt>
+              </c:strCache>
+            </c:strRef>
+          </c:tx>
+          <c:cat>
+            <c:strRef>
+              <c:f>Sheet1!$A$2:$A$5</c:f>
+              <c:strCache>
+                <c:ptCount val="4"/>
+                <c:pt idx="0">
+                  <c:v>Merge Sort </c:v>
+                </c:pt>
+                <c:pt idx="1">
+                  <c:v>Quick Sort - pivot random</c:v>
+                </c:pt>
+                <c:pt idx="2">
+                  <c:v>Quick Sort - mediana din 5 </c:v>
+                </c:pt>
+                <c:pt idx="3">
+                  <c:v>Quick Sort - mediana medianelor </c:v>
+                </c:pt>
+              </c:strCache>
+            </c:strRef>
+          </c:cat>
+          <c:val>
+            <c:numRef>
+              <c:f>Sheet1!$B$2:$B$5</c:f>
+            </c:numRef>
+          </c:val>
+        </c:ser>
+        <c:ser>
+          <c:idx val="1"/>
+          <c:order val="1"/>
+          <c:tx>
+            <c:strRef>
+              <c:f>Sheet1!$C$1</c:f>
+              <c:strCache>
+                <c:ptCount val="1"/>
+                <c:pt idx="0">
+                  <c:v>10^5 </c:v>
+                </c:pt>
+              </c:strCache>
+            </c:strRef>
+          </c:tx>
+          <c:cat>
+            <c:strRef>
+              <c:f>Sheet1!$A$2:$A$5</c:f>
+              <c:strCache>
+                <c:ptCount val="4"/>
+                <c:pt idx="0">
+                  <c:v>Merge Sort </c:v>
+                </c:pt>
+                <c:pt idx="1">
+                  <c:v>Quick Sort - pivot random</c:v>
+                </c:pt>
+                <c:pt idx="2">
+                  <c:v>Quick Sort - mediana din 5 </c:v>
+                </c:pt>
+                <c:pt idx="3">
+                  <c:v>Quick Sort - mediana medianelor </c:v>
+                </c:pt>
+              </c:strCache>
+            </c:strRef>
+          </c:cat>
+          <c:val>
+            <c:numRef>
+              <c:f>Sheet1!$C$2:$C$5</c:f>
+            </c:numRef>
+          </c:val>
+        </c:ser>
+        <c:ser>
+          <c:idx val="2"/>
+          <c:order val="2"/>
+          <c:tx>
+            <c:strRef>
+              <c:f>Sheet1!$D$1</c:f>
+              <c:strCache>
+                <c:ptCount val="1"/>
+                <c:pt idx="0">
+                  <c:v>10^6 </c:v>
+                </c:pt>
+              </c:strCache>
+            </c:strRef>
+          </c:tx>
+          <c:cat>
+            <c:strRef>
+              <c:f>Sheet1!$A$2:$A$5</c:f>
+              <c:strCache>
+                <c:ptCount val="4"/>
+                <c:pt idx="0">
+                  <c:v>Merge Sort </c:v>
+                </c:pt>
+                <c:pt idx="1">
+                  <c:v>Quick Sort - pivot random</c:v>
+                </c:pt>
+                <c:pt idx="2">
+                  <c:v>Quick Sort - mediana din 5 </c:v>
+                </c:pt>
+                <c:pt idx="3">
+                  <c:v>Quick Sort - mediana medianelor </c:v>
+                </c:pt>
+              </c:strCache>
+            </c:strRef>
+          </c:cat>
+          <c:val>
+            <c:numRef>
+              <c:f>Sheet1!$D$2:$D$5</c:f>
+            </c:numRef>
+          </c:val>
+        </c:ser>
+        <c:ser>
+          <c:idx val="3"/>
+          <c:order val="3"/>
+          <c:tx>
+            <c:strRef>
+              <c:f>Sheet1!$E$1</c:f>
+              <c:strCache>
+                <c:ptCount val="1"/>
+                <c:pt idx="0">
+                  <c:v>10^7 </c:v>
+                </c:pt>
+              </c:strCache>
+            </c:strRef>
+          </c:tx>
+          <c:cat>
+            <c:strRef>
+              <c:f>Sheet1!$A$2:$A$5</c:f>
+              <c:strCache>
+                <c:ptCount val="4"/>
+                <c:pt idx="0">
+                  <c:v>Merge Sort </c:v>
+                </c:pt>
+                <c:pt idx="1">
+                  <c:v>Quick Sort - pivot random</c:v>
+                </c:pt>
+                <c:pt idx="2">
+                  <c:v>Quick Sort - mediana din 5 </c:v>
+                </c:pt>
+                <c:pt idx="3">
+                  <c:v>Quick Sort - mediana medianelor </c:v>
+                </c:pt>
+              </c:strCache>
+            </c:strRef>
+          </c:cat>
+          <c:val>
+            <c:numRef>
+              <c:f>Sheet1!$E$2:$E$5</c:f>
+              <c:numCache>
+                <c:formatCode>General</c:formatCode>
+                <c:ptCount val="4"/>
+                <c:pt idx="0">
+                  <c:v>65.749664068222003</c:v>
+                </c:pt>
+                <c:pt idx="1">
+                  <c:v>51.029878854751502</c:v>
+                </c:pt>
+                <c:pt idx="2">
+                  <c:v>49.5384037494659</c:v>
+                </c:pt>
+                <c:pt idx="3">
+                  <c:v>53.296721696853602</c:v>
+                </c:pt>
+              </c:numCache>
+            </c:numRef>
+          </c:val>
+        </c:ser>
+        <c:axId val="166001280"/>
+        <c:axId val="166216448"/>
+      </c:barChart>
+      <c:catAx>
+        <c:axId val="166001280"/>
+        <c:scaling>
+          <c:orientation val="minMax"/>
+        </c:scaling>
+        <c:axPos val="b"/>
+        <c:numFmt formatCode="General" sourceLinked="1"/>
+        <c:tickLblPos val="nextTo"/>
+        <c:crossAx val="166216448"/>
+        <c:crosses val="autoZero"/>
+        <c:auto val="1"/>
+        <c:lblAlgn val="ctr"/>
+        <c:lblOffset val="100"/>
+      </c:catAx>
+      <c:valAx>
+        <c:axId val="166216448"/>
+        <c:scaling>
+          <c:orientation val="minMax"/>
+        </c:scaling>
+        <c:axPos val="l"/>
+        <c:majorGridlines/>
+        <c:numFmt formatCode="General" sourceLinked="1"/>
+        <c:tickLblPos val="nextTo"/>
+        <c:crossAx val="166001280"/>
+        <c:crosses val="autoZero"/>
+        <c:crossBetween val="between"/>
+      </c:valAx>
+    </c:plotArea>
+    <c:legend>
+      <c:legendPos val="r"/>
+      <c:layout/>
+    </c:legend>
+    <c:plotVisOnly val="1"/>
+    <c:dispBlanksAs val="zero"/>
+  </c:chart>
+  <c:txPr>
+    <a:bodyPr/>
+    <a:lstStyle/>
+    <a:p>
+      <a:pPr>
+        <a:defRPr sz="1800"/>
+      </a:pPr>
+      <a:endParaRPr lang="en-US"/>
+    </a:p>
+  </c:txPr>
+  <c:externalData r:id="rId1"/>
+</c:chartSpace>
+</file>
+
 <file path=ppt/charts/chart2.xml><?xml version="1.0" encoding="utf-8"?>
 <c:chartSpace xmlns:c="http://schemas.openxmlformats.org/drawingml/2006/chart" xmlns:a="http://schemas.openxmlformats.org/drawingml/2006/main" xmlns:r="http://schemas.openxmlformats.org/officeDocument/2006/relationships">
   <c:lang val="en-US"/>
@@ -872,6 +2435,11 @@
               </c:strCache>
             </c:strRef>
           </c:tx>
+          <c:spPr>
+            <a:solidFill>
+              <a:srgbClr val="FFC000"/>
+            </a:solidFill>
+          </c:spPr>
           <c:cat>
             <c:strRef>
               <c:f>Sheet1!$A$2:$A$5</c:f>
@@ -930,7 +2498,7 @@
           </c:tx>
           <c:spPr>
             <a:solidFill>
-              <a:srgbClr val="FF0000"/>
+              <a:srgbClr val="CC0099"/>
             </a:solidFill>
           </c:spPr>
           <c:cat>
@@ -1118,9 +2686,9 @@
           </c:spPr>
           <c:cat>
             <c:strRef>
-              <c:f>Sheet1!$A$2:$A$5</c:f>
+              <c:f>Sheet1!$A$2:$A$6</c:f>
               <c:strCache>
-                <c:ptCount val="4"/>
+                <c:ptCount val="5"/>
                 <c:pt idx="0">
                   <c:v>Merge Sort</c:v>
                 </c:pt>
@@ -1131,17 +2699,20 @@
                   <c:v>Quick Sort -mediana din 5</c:v>
                 </c:pt>
                 <c:pt idx="3">
-                  <c:v>Heap Sort</c:v>
+                  <c:v>Shell Sort 2^k-1 </c:v>
+                </c:pt>
+                <c:pt idx="4">
+                  <c:v>Shell Sort 3k+1</c:v>
                 </c:pt>
               </c:strCache>
             </c:strRef>
           </c:cat>
           <c:val>
             <c:numRef>
-              <c:f>Sheet1!$B$2:$B$5</c:f>
+              <c:f>Sheet1!$B$2:$B$6</c:f>
               <c:numCache>
                 <c:formatCode>General</c:formatCode>
-                <c:ptCount val="4"/>
+                <c:ptCount val="5"/>
                 <c:pt idx="0">
                   <c:v>5.0990848541259703</c:v>
                 </c:pt>
@@ -1152,7 +2723,10 @@
                   <c:v>3.8218793869018501</c:v>
                 </c:pt>
                 <c:pt idx="3">
-                  <c:v>14.6300764083862</c:v>
+                  <c:v>40.7612173557281</c:v>
+                </c:pt>
+                <c:pt idx="4">
+                  <c:v>29.0927073955535</c:v>
                 </c:pt>
               </c:numCache>
             </c:numRef>
@@ -1179,9 +2753,9 @@
           </c:spPr>
           <c:cat>
             <c:strRef>
-              <c:f>Sheet1!$A$2:$A$5</c:f>
+              <c:f>Sheet1!$A$2:$A$6</c:f>
               <c:strCache>
-                <c:ptCount val="4"/>
+                <c:ptCount val="5"/>
                 <c:pt idx="0">
                   <c:v>Merge Sort</c:v>
                 </c:pt>
@@ -1192,17 +2766,20 @@
                   <c:v>Quick Sort -mediana din 5</c:v>
                 </c:pt>
                 <c:pt idx="3">
-                  <c:v>Heap Sort</c:v>
+                  <c:v>Shell Sort 2^k-1 </c:v>
+                </c:pt>
+                <c:pt idx="4">
+                  <c:v>Shell Sort 3k+1</c:v>
                 </c:pt>
               </c:strCache>
             </c:strRef>
           </c:cat>
           <c:val>
             <c:numRef>
-              <c:f>Sheet1!$C$2:$C$5</c:f>
+              <c:f>Sheet1!$C$2:$C$6</c:f>
               <c:numCache>
                 <c:formatCode>General</c:formatCode>
-                <c:ptCount val="4"/>
+                <c:ptCount val="5"/>
                 <c:pt idx="0">
                   <c:v>4.1496284008026096</c:v>
                 </c:pt>
@@ -1213,7 +2790,10 @@
                   <c:v>4.5103061199188197</c:v>
                 </c:pt>
                 <c:pt idx="3">
-                  <c:v>12.2441613674163</c:v>
+                  <c:v>32.584412097930901</c:v>
+                </c:pt>
+                <c:pt idx="4">
+                  <c:v>4.41522145271301</c:v>
                 </c:pt>
               </c:numCache>
             </c:numRef>
@@ -1233,11 +2813,16 @@
               </c:strCache>
             </c:strRef>
           </c:tx>
+          <c:spPr>
+            <a:solidFill>
+              <a:srgbClr val="CC0099"/>
+            </a:solidFill>
+          </c:spPr>
           <c:cat>
             <c:strRef>
-              <c:f>Sheet1!$A$2:$A$5</c:f>
+              <c:f>Sheet1!$A$2:$A$6</c:f>
               <c:strCache>
-                <c:ptCount val="4"/>
+                <c:ptCount val="5"/>
                 <c:pt idx="0">
                   <c:v>Merge Sort</c:v>
                 </c:pt>
@@ -1248,17 +2833,20 @@
                   <c:v>Quick Sort -mediana din 5</c:v>
                 </c:pt>
                 <c:pt idx="3">
-                  <c:v>Heap Sort</c:v>
+                  <c:v>Shell Sort 2^k-1 </c:v>
+                </c:pt>
+                <c:pt idx="4">
+                  <c:v>Shell Sort 3k+1</c:v>
                 </c:pt>
               </c:strCache>
             </c:strRef>
           </c:cat>
           <c:val>
             <c:numRef>
-              <c:f>Sheet1!$D$2:$D$5</c:f>
+              <c:f>Sheet1!$D$2:$D$6</c:f>
               <c:numCache>
                 <c:formatCode>General</c:formatCode>
-                <c:ptCount val="4"/>
+                <c:ptCount val="5"/>
                 <c:pt idx="0">
                   <c:v>4.31044220924377</c:v>
                 </c:pt>
@@ -1269,91 +2857,33 @@
                   <c:v>4.1180353164672798</c:v>
                 </c:pt>
                 <c:pt idx="3">
-                  <c:v>13.303928136825499</c:v>
+                  <c:v>3.2051875591278001</c:v>
+                </c:pt>
+                <c:pt idx="4">
+                  <c:v>3.1335358619689901</c:v>
                 </c:pt>
               </c:numCache>
             </c:numRef>
           </c:val>
         </c:ser>
-        <c:ser>
-          <c:idx val="3"/>
-          <c:order val="3"/>
-          <c:tx>
-            <c:strRef>
-              <c:f>Sheet1!$E$1</c:f>
-              <c:strCache>
-                <c:ptCount val="1"/>
-                <c:pt idx="0">
-                  <c:v>Multe valori distincte</c:v>
-                </c:pt>
-              </c:strCache>
-            </c:strRef>
-          </c:tx>
-          <c:spPr>
-            <a:solidFill>
-              <a:srgbClr val="FF0000"/>
-            </a:solidFill>
-          </c:spPr>
-          <c:cat>
-            <c:strRef>
-              <c:f>Sheet1!$A$2:$A$5</c:f>
-              <c:strCache>
-                <c:ptCount val="4"/>
-                <c:pt idx="0">
-                  <c:v>Merge Sort</c:v>
-                </c:pt>
-                <c:pt idx="1">
-                  <c:v>Quick Sort -random pivot</c:v>
-                </c:pt>
-                <c:pt idx="2">
-                  <c:v>Quick Sort -mediana din 5</c:v>
-                </c:pt>
-                <c:pt idx="3">
-                  <c:v>Heap Sort</c:v>
-                </c:pt>
-              </c:strCache>
-            </c:strRef>
-          </c:cat>
-          <c:val>
-            <c:numRef>
-              <c:f>Sheet1!$E$2:$E$5</c:f>
-              <c:numCache>
-                <c:formatCode>General</c:formatCode>
-                <c:ptCount val="4"/>
-                <c:pt idx="0">
-                  <c:v>5.1360726356506303</c:v>
-                </c:pt>
-                <c:pt idx="1">
-                  <c:v>4.3684172630309996</c:v>
-                </c:pt>
-                <c:pt idx="2">
-                  <c:v>3.9883406162261901</c:v>
-                </c:pt>
-                <c:pt idx="3">
-                  <c:v>14.715374469757</c:v>
-                </c:pt>
-              </c:numCache>
-            </c:numRef>
-          </c:val>
-        </c:ser>
-        <c:axId val="163367168"/>
-        <c:axId val="163455744"/>
+        <c:axId val="163458048"/>
+        <c:axId val="163652352"/>
       </c:barChart>
       <c:catAx>
-        <c:axId val="163367168"/>
+        <c:axId val="163458048"/>
         <c:scaling>
           <c:orientation val="minMax"/>
         </c:scaling>
         <c:axPos val="b"/>
         <c:tickLblPos val="nextTo"/>
-        <c:crossAx val="163455744"/>
+        <c:crossAx val="163652352"/>
         <c:crosses val="autoZero"/>
         <c:auto val="1"/>
         <c:lblAlgn val="ctr"/>
         <c:lblOffset val="100"/>
       </c:catAx>
       <c:valAx>
-        <c:axId val="163455744"/>
+        <c:axId val="163652352"/>
         <c:scaling>
           <c:orientation val="minMax"/>
         </c:scaling>
@@ -1361,7 +2891,7 @@
         <c:majorGridlines/>
         <c:numFmt formatCode="General" sourceLinked="1"/>
         <c:tickLblPos val="nextTo"/>
-        <c:crossAx val="163367168"/>
+        <c:crossAx val="163458048"/>
         <c:crosses val="autoZero"/>
         <c:crossBetween val="between"/>
       </c:valAx>
@@ -1416,9 +2946,9 @@
           </c:spPr>
           <c:cat>
             <c:strRef>
-              <c:f>Sheet1!$A$2:$A$6</c:f>
+              <c:f>Sheet1!$A$2:$A$5</c:f>
               <c:strCache>
-                <c:ptCount val="5"/>
+                <c:ptCount val="4"/>
                 <c:pt idx="0">
                   <c:v>Merge Sort</c:v>
                 </c:pt>
@@ -1429,20 +2959,17 @@
                   <c:v>Quick Sort -mediana din 5</c:v>
                 </c:pt>
                 <c:pt idx="3">
-                  <c:v>Shell Sort 2^k-1 </c:v>
-                </c:pt>
-                <c:pt idx="4">
-                  <c:v>Shell Sort 3k+1</c:v>
+                  <c:v>Heap Sort</c:v>
                 </c:pt>
               </c:strCache>
             </c:strRef>
           </c:cat>
           <c:val>
             <c:numRef>
-              <c:f>Sheet1!$B$2:$B$6</c:f>
+              <c:f>Sheet1!$B$2:$B$5</c:f>
               <c:numCache>
                 <c:formatCode>General</c:formatCode>
-                <c:ptCount val="5"/>
+                <c:ptCount val="4"/>
                 <c:pt idx="0">
                   <c:v>5.0990848541259703</c:v>
                 </c:pt>
@@ -1453,10 +2980,7 @@
                   <c:v>3.8218793869018501</c:v>
                 </c:pt>
                 <c:pt idx="3">
-                  <c:v>40.7612173557281</c:v>
-                </c:pt>
-                <c:pt idx="4">
-                  <c:v>29.0927073955535</c:v>
+                  <c:v>14.6300764083862</c:v>
                 </c:pt>
               </c:numCache>
             </c:numRef>
@@ -1483,9 +3007,9 @@
           </c:spPr>
           <c:cat>
             <c:strRef>
-              <c:f>Sheet1!$A$2:$A$6</c:f>
+              <c:f>Sheet1!$A$2:$A$5</c:f>
               <c:strCache>
-                <c:ptCount val="5"/>
+                <c:ptCount val="4"/>
                 <c:pt idx="0">
                   <c:v>Merge Sort</c:v>
                 </c:pt>
@@ -1496,20 +3020,17 @@
                   <c:v>Quick Sort -mediana din 5</c:v>
                 </c:pt>
                 <c:pt idx="3">
-                  <c:v>Shell Sort 2^k-1 </c:v>
-                </c:pt>
-                <c:pt idx="4">
-                  <c:v>Shell Sort 3k+1</c:v>
+                  <c:v>Heap Sort</c:v>
                 </c:pt>
               </c:strCache>
             </c:strRef>
           </c:cat>
           <c:val>
             <c:numRef>
-              <c:f>Sheet1!$C$2:$C$6</c:f>
+              <c:f>Sheet1!$C$2:$C$5</c:f>
               <c:numCache>
                 <c:formatCode>General</c:formatCode>
-                <c:ptCount val="5"/>
+                <c:ptCount val="4"/>
                 <c:pt idx="0">
                   <c:v>4.1496284008026096</c:v>
                 </c:pt>
@@ -1520,10 +3041,7 @@
                   <c:v>4.5103061199188197</c:v>
                 </c:pt>
                 <c:pt idx="3">
-                  <c:v>32.584412097930901</c:v>
-                </c:pt>
-                <c:pt idx="4">
-                  <c:v>4.41522145271301</c:v>
+                  <c:v>12.2441613674163</c:v>
                 </c:pt>
               </c:numCache>
             </c:numRef>
@@ -1545,9 +3063,9 @@
           </c:tx>
           <c:cat>
             <c:strRef>
-              <c:f>Sheet1!$A$2:$A$6</c:f>
+              <c:f>Sheet1!$A$2:$A$5</c:f>
               <c:strCache>
-                <c:ptCount val="5"/>
+                <c:ptCount val="4"/>
                 <c:pt idx="0">
                   <c:v>Merge Sort</c:v>
                 </c:pt>
@@ -1558,20 +3076,17 @@
                   <c:v>Quick Sort -mediana din 5</c:v>
                 </c:pt>
                 <c:pt idx="3">
-                  <c:v>Shell Sort 2^k-1 </c:v>
-                </c:pt>
-                <c:pt idx="4">
-                  <c:v>Shell Sort 3k+1</c:v>
+                  <c:v>Heap Sort</c:v>
                 </c:pt>
               </c:strCache>
             </c:strRef>
           </c:cat>
           <c:val>
             <c:numRef>
-              <c:f>Sheet1!$D$2:$D$6</c:f>
+              <c:f>Sheet1!$D$2:$D$5</c:f>
               <c:numCache>
                 <c:formatCode>General</c:formatCode>
-                <c:ptCount val="5"/>
+                <c:ptCount val="4"/>
                 <c:pt idx="0">
                   <c:v>4.31044220924377</c:v>
                 </c:pt>
@@ -1582,33 +3097,91 @@
                   <c:v>4.1180353164672798</c:v>
                 </c:pt>
                 <c:pt idx="3">
-                  <c:v>3.2051875591278001</c:v>
-                </c:pt>
-                <c:pt idx="4">
-                  <c:v>3.1335358619689901</c:v>
+                  <c:v>13.303928136825499</c:v>
                 </c:pt>
               </c:numCache>
             </c:numRef>
           </c:val>
         </c:ser>
-        <c:axId val="163458048"/>
-        <c:axId val="163652352"/>
+        <c:ser>
+          <c:idx val="3"/>
+          <c:order val="3"/>
+          <c:tx>
+            <c:strRef>
+              <c:f>Sheet1!$E$1</c:f>
+              <c:strCache>
+                <c:ptCount val="1"/>
+                <c:pt idx="0">
+                  <c:v>Multe valori distincte</c:v>
+                </c:pt>
+              </c:strCache>
+            </c:strRef>
+          </c:tx>
+          <c:spPr>
+            <a:solidFill>
+              <a:srgbClr val="FF0000"/>
+            </a:solidFill>
+          </c:spPr>
+          <c:cat>
+            <c:strRef>
+              <c:f>Sheet1!$A$2:$A$5</c:f>
+              <c:strCache>
+                <c:ptCount val="4"/>
+                <c:pt idx="0">
+                  <c:v>Merge Sort</c:v>
+                </c:pt>
+                <c:pt idx="1">
+                  <c:v>Quick Sort -random pivot</c:v>
+                </c:pt>
+                <c:pt idx="2">
+                  <c:v>Quick Sort -mediana din 5</c:v>
+                </c:pt>
+                <c:pt idx="3">
+                  <c:v>Heap Sort</c:v>
+                </c:pt>
+              </c:strCache>
+            </c:strRef>
+          </c:cat>
+          <c:val>
+            <c:numRef>
+              <c:f>Sheet1!$E$2:$E$5</c:f>
+              <c:numCache>
+                <c:formatCode>General</c:formatCode>
+                <c:ptCount val="4"/>
+                <c:pt idx="0">
+                  <c:v>5.1360726356506303</c:v>
+                </c:pt>
+                <c:pt idx="1">
+                  <c:v>4.3684172630309996</c:v>
+                </c:pt>
+                <c:pt idx="2">
+                  <c:v>3.9883406162261901</c:v>
+                </c:pt>
+                <c:pt idx="3">
+                  <c:v>14.715374469757</c:v>
+                </c:pt>
+              </c:numCache>
+            </c:numRef>
+          </c:val>
+        </c:ser>
+        <c:axId val="163367168"/>
+        <c:axId val="163455744"/>
       </c:barChart>
       <c:catAx>
-        <c:axId val="163458048"/>
+        <c:axId val="163367168"/>
         <c:scaling>
           <c:orientation val="minMax"/>
         </c:scaling>
         <c:axPos val="b"/>
         <c:tickLblPos val="nextTo"/>
-        <c:crossAx val="163652352"/>
+        <c:crossAx val="163455744"/>
         <c:crosses val="autoZero"/>
         <c:auto val="1"/>
         <c:lblAlgn val="ctr"/>
         <c:lblOffset val="100"/>
       </c:catAx>
       <c:valAx>
-        <c:axId val="163652352"/>
+        <c:axId val="163455744"/>
         <c:scaling>
           <c:orientation val="minMax"/>
         </c:scaling>
@@ -1616,7 +3189,7 @@
         <c:majorGridlines/>
         <c:numFmt formatCode="General" sourceLinked="1"/>
         <c:tickLblPos val="nextTo"/>
-        <c:crossAx val="163458048"/>
+        <c:crossAx val="163367168"/>
         <c:crosses val="autoZero"/>
         <c:crossBetween val="between"/>
       </c:valAx>
@@ -2102,99 +3675,403 @@
 <file path=ppt/charts/chart7.xml><?xml version="1.0" encoding="utf-8"?>
 <c:chartSpace xmlns:c="http://schemas.openxmlformats.org/drawingml/2006/chart" xmlns:a="http://schemas.openxmlformats.org/drawingml/2006/main" xmlns:r="http://schemas.openxmlformats.org/officeDocument/2006/relationships">
   <c:lang val="en-US"/>
+  <c:style val="26"/>
   <c:chart>
-    <c:title>
-      <c:layout/>
-    </c:title>
     <c:plotArea>
       <c:layout/>
-      <c:barChart>
-        <c:barDir val="col"/>
-        <c:grouping val="clustered"/>
+      <c:lineChart>
+        <c:grouping val="standard"/>
         <c:ser>
           <c:idx val="0"/>
           <c:order val="0"/>
           <c:tx>
             <c:strRef>
-              <c:f>Sheet1!$B$1</c:f>
+              <c:f>Sheet1!$A$2</c:f>
               <c:strCache>
                 <c:ptCount val="1"/>
                 <c:pt idx="0">
-                  <c:v>10^5</c:v>
+                  <c:v>Default Sort</c:v>
                 </c:pt>
               </c:strCache>
             </c:strRef>
           </c:tx>
-          <c:spPr>
-            <a:solidFill>
-              <a:srgbClr val="00B050"/>
-            </a:solidFill>
-          </c:spPr>
+          <c:marker>
+            <c:symbol val="none"/>
+          </c:marker>
           <c:cat>
             <c:strRef>
-              <c:f>Sheet1!$A$2:$A$8</c:f>
+              <c:f>Sheet1!$B$1:$D$1</c:f>
               <c:strCache>
-                <c:ptCount val="7"/>
-                <c:pt idx="0">
-                  <c:v>Default Sort</c:v>
+                <c:ptCount val="3"/>
+                <c:pt idx="0">
+                  <c:v>10^5</c:v>
                 </c:pt>
                 <c:pt idx="1">
-                  <c:v>Radix 2^10</c:v>
+                  <c:v>10^6</c:v>
                 </c:pt>
                 <c:pt idx="2">
-                  <c:v>Radix 2^12 </c:v>
-                </c:pt>
-                <c:pt idx="3">
-                  <c:v>Radix 2^16</c:v>
-                </c:pt>
-                <c:pt idx="4">
-                  <c:v>Merge Sort</c:v>
-                </c:pt>
-                <c:pt idx="5">
-                  <c:v>Quick Sort - pivot random</c:v>
-                </c:pt>
-                <c:pt idx="6">
-                  <c:v>Quick Sort - mediana din 5</c:v>
+                  <c:v>10^7</c:v>
                 </c:pt>
               </c:strCache>
             </c:strRef>
           </c:cat>
           <c:val>
             <c:numRef>
-              <c:f>Sheet1!$B$2:$B$8</c:f>
+              <c:f>Sheet1!$B$2:$D$2</c:f>
               <c:numCache>
                 <c:formatCode>General</c:formatCode>
-                <c:ptCount val="7"/>
+                <c:ptCount val="3"/>
                 <c:pt idx="0">
                   <c:v>1.2348413467407201E-2</c:v>
                 </c:pt>
                 <c:pt idx="1">
-                  <c:v>0.16510057449340801</c:v>
+                  <c:v>0.25980329513549799</c:v>
                 </c:pt>
                 <c:pt idx="2">
-                  <c:v>0.12478518486022901</c:v>
-                </c:pt>
-                <c:pt idx="3">
-                  <c:v>8.4300994873046806E-2</c:v>
-                </c:pt>
-                <c:pt idx="4">
-                  <c:v>0.38062334060668901</c:v>
-                </c:pt>
-                <c:pt idx="5">
-                  <c:v>0.3566575050354</c:v>
-                </c:pt>
-                <c:pt idx="6">
-                  <c:v>0.298470258712768</c:v>
+                  <c:v>3.7157714366912802</c:v>
                 </c:pt>
               </c:numCache>
             </c:numRef>
           </c:val>
         </c:ser>
-        <c:axId val="146822272"/>
+        <c:ser>
+          <c:idx val="1"/>
+          <c:order val="1"/>
+          <c:tx>
+            <c:strRef>
+              <c:f>Sheet1!$A$3</c:f>
+              <c:strCache>
+                <c:ptCount val="1"/>
+                <c:pt idx="0">
+                  <c:v>Radix 2^10</c:v>
+                </c:pt>
+              </c:strCache>
+            </c:strRef>
+          </c:tx>
+          <c:marker>
+            <c:symbol val="none"/>
+          </c:marker>
+          <c:cat>
+            <c:strRef>
+              <c:f>Sheet1!$B$1:$D$1</c:f>
+              <c:strCache>
+                <c:ptCount val="3"/>
+                <c:pt idx="0">
+                  <c:v>10^5</c:v>
+                </c:pt>
+                <c:pt idx="1">
+                  <c:v>10^6</c:v>
+                </c:pt>
+                <c:pt idx="2">
+                  <c:v>10^7</c:v>
+                </c:pt>
+              </c:strCache>
+            </c:strRef>
+          </c:cat>
+          <c:val>
+            <c:numRef>
+              <c:f>Sheet1!$B$3:$D$3</c:f>
+              <c:numCache>
+                <c:formatCode>General</c:formatCode>
+                <c:ptCount val="3"/>
+                <c:pt idx="0">
+                  <c:v>0.16510057449340801</c:v>
+                </c:pt>
+                <c:pt idx="1">
+                  <c:v>2.32021784782409</c:v>
+                </c:pt>
+                <c:pt idx="2">
+                  <c:v>26.2707934379577</c:v>
+                </c:pt>
+              </c:numCache>
+            </c:numRef>
+          </c:val>
+        </c:ser>
+        <c:ser>
+          <c:idx val="2"/>
+          <c:order val="2"/>
+          <c:tx>
+            <c:strRef>
+              <c:f>Sheet1!$A$4</c:f>
+              <c:strCache>
+                <c:ptCount val="1"/>
+                <c:pt idx="0">
+                  <c:v>Radix 2^12 </c:v>
+                </c:pt>
+              </c:strCache>
+            </c:strRef>
+          </c:tx>
+          <c:marker>
+            <c:symbol val="none"/>
+          </c:marker>
+          <c:cat>
+            <c:strRef>
+              <c:f>Sheet1!$B$1:$D$1</c:f>
+              <c:strCache>
+                <c:ptCount val="3"/>
+                <c:pt idx="0">
+                  <c:v>10^5</c:v>
+                </c:pt>
+                <c:pt idx="1">
+                  <c:v>10^6</c:v>
+                </c:pt>
+                <c:pt idx="2">
+                  <c:v>10^7</c:v>
+                </c:pt>
+              </c:strCache>
+            </c:strRef>
+          </c:cat>
+          <c:val>
+            <c:numRef>
+              <c:f>Sheet1!$B$4:$D$4</c:f>
+              <c:numCache>
+                <c:formatCode>General</c:formatCode>
+                <c:ptCount val="3"/>
+                <c:pt idx="0">
+                  <c:v>0.12478518486022901</c:v>
+                </c:pt>
+                <c:pt idx="1">
+                  <c:v>2.3022725582122798</c:v>
+                </c:pt>
+                <c:pt idx="2">
+                  <c:v>40.795489072799597</c:v>
+                </c:pt>
+              </c:numCache>
+            </c:numRef>
+          </c:val>
+        </c:ser>
+        <c:ser>
+          <c:idx val="3"/>
+          <c:order val="3"/>
+          <c:tx>
+            <c:strRef>
+              <c:f>Sheet1!$A$5</c:f>
+              <c:strCache>
+                <c:ptCount val="1"/>
+                <c:pt idx="0">
+                  <c:v>Radix 2^16</c:v>
+                </c:pt>
+              </c:strCache>
+            </c:strRef>
+          </c:tx>
+          <c:marker>
+            <c:symbol val="none"/>
+          </c:marker>
+          <c:cat>
+            <c:strRef>
+              <c:f>Sheet1!$B$1:$D$1</c:f>
+              <c:strCache>
+                <c:ptCount val="3"/>
+                <c:pt idx="0">
+                  <c:v>10^5</c:v>
+                </c:pt>
+                <c:pt idx="1">
+                  <c:v>10^6</c:v>
+                </c:pt>
+                <c:pt idx="2">
+                  <c:v>10^7</c:v>
+                </c:pt>
+              </c:strCache>
+            </c:strRef>
+          </c:cat>
+          <c:val>
+            <c:numRef>
+              <c:f>Sheet1!$B$5:$D$5</c:f>
+              <c:numCache>
+                <c:formatCode>General</c:formatCode>
+                <c:ptCount val="3"/>
+                <c:pt idx="0">
+                  <c:v>8.4300994873046806E-2</c:v>
+                </c:pt>
+                <c:pt idx="1">
+                  <c:v>1.57616090774536</c:v>
+                </c:pt>
+                <c:pt idx="2">
+                  <c:v>17.465894699096602</c:v>
+                </c:pt>
+              </c:numCache>
+            </c:numRef>
+          </c:val>
+        </c:ser>
+        <c:ser>
+          <c:idx val="4"/>
+          <c:order val="4"/>
+          <c:tx>
+            <c:strRef>
+              <c:f>Sheet1!$A$6</c:f>
+              <c:strCache>
+                <c:ptCount val="1"/>
+                <c:pt idx="0">
+                  <c:v>Merge Sort</c:v>
+                </c:pt>
+              </c:strCache>
+            </c:strRef>
+          </c:tx>
+          <c:marker>
+            <c:symbol val="none"/>
+          </c:marker>
+          <c:cat>
+            <c:strRef>
+              <c:f>Sheet1!$B$1:$D$1</c:f>
+              <c:strCache>
+                <c:ptCount val="3"/>
+                <c:pt idx="0">
+                  <c:v>10^5</c:v>
+                </c:pt>
+                <c:pt idx="1">
+                  <c:v>10^6</c:v>
+                </c:pt>
+                <c:pt idx="2">
+                  <c:v>10^7</c:v>
+                </c:pt>
+              </c:strCache>
+            </c:strRef>
+          </c:cat>
+          <c:val>
+            <c:numRef>
+              <c:f>Sheet1!$B$6:$D$6</c:f>
+              <c:numCache>
+                <c:formatCode>General</c:formatCode>
+                <c:ptCount val="3"/>
+                <c:pt idx="0">
+                  <c:v>0.38062334060668901</c:v>
+                </c:pt>
+                <c:pt idx="1">
+                  <c:v>5.1507411003112704</c:v>
+                </c:pt>
+                <c:pt idx="2">
+                  <c:v>69.752348423004094</c:v>
+                </c:pt>
+              </c:numCache>
+            </c:numRef>
+          </c:val>
+        </c:ser>
+        <c:ser>
+          <c:idx val="5"/>
+          <c:order val="5"/>
+          <c:tx>
+            <c:strRef>
+              <c:f>Sheet1!$A$7</c:f>
+              <c:strCache>
+                <c:ptCount val="1"/>
+                <c:pt idx="0">
+                  <c:v>Quick Sort - pivot random</c:v>
+                </c:pt>
+              </c:strCache>
+            </c:strRef>
+          </c:tx>
+          <c:spPr>
+            <a:ln>
+              <a:solidFill>
+                <a:srgbClr val="C00000"/>
+              </a:solidFill>
+            </a:ln>
+          </c:spPr>
+          <c:marker>
+            <c:symbol val="none"/>
+          </c:marker>
+          <c:cat>
+            <c:strRef>
+              <c:f>Sheet1!$B$1:$D$1</c:f>
+              <c:strCache>
+                <c:ptCount val="3"/>
+                <c:pt idx="0">
+                  <c:v>10^5</c:v>
+                </c:pt>
+                <c:pt idx="1">
+                  <c:v>10^6</c:v>
+                </c:pt>
+                <c:pt idx="2">
+                  <c:v>10^7</c:v>
+                </c:pt>
+              </c:strCache>
+            </c:strRef>
+          </c:cat>
+          <c:val>
+            <c:numRef>
+              <c:f>Sheet1!$B$7:$D$7</c:f>
+              <c:numCache>
+                <c:formatCode>General</c:formatCode>
+                <c:ptCount val="3"/>
+                <c:pt idx="0">
+                  <c:v>0.3566575050354</c:v>
+                </c:pt>
+                <c:pt idx="1">
+                  <c:v>3.9369254112243599</c:v>
+                </c:pt>
+                <c:pt idx="2">
+                  <c:v>53.246130228042603</c:v>
+                </c:pt>
+              </c:numCache>
+            </c:numRef>
+          </c:val>
+        </c:ser>
+        <c:ser>
+          <c:idx val="6"/>
+          <c:order val="6"/>
+          <c:tx>
+            <c:strRef>
+              <c:f>Sheet1!$A$8</c:f>
+              <c:strCache>
+                <c:ptCount val="1"/>
+                <c:pt idx="0">
+                  <c:v>Quick Sort - mediana din 5</c:v>
+                </c:pt>
+              </c:strCache>
+            </c:strRef>
+          </c:tx>
+          <c:spPr>
+            <a:ln>
+              <a:solidFill>
+                <a:srgbClr val="92D050"/>
+              </a:solidFill>
+            </a:ln>
+          </c:spPr>
+          <c:marker>
+            <c:symbol val="none"/>
+          </c:marker>
+          <c:cat>
+            <c:strRef>
+              <c:f>Sheet1!$B$1:$D$1</c:f>
+              <c:strCache>
+                <c:ptCount val="3"/>
+                <c:pt idx="0">
+                  <c:v>10^5</c:v>
+                </c:pt>
+                <c:pt idx="1">
+                  <c:v>10^6</c:v>
+                </c:pt>
+                <c:pt idx="2">
+                  <c:v>10^7</c:v>
+                </c:pt>
+              </c:strCache>
+            </c:strRef>
+          </c:cat>
+          <c:val>
+            <c:numRef>
+              <c:f>Sheet1!$B$8:$D$8</c:f>
+              <c:numCache>
+                <c:formatCode>General</c:formatCode>
+                <c:ptCount val="3"/>
+                <c:pt idx="0">
+                  <c:v>0.298470258712768</c:v>
+                </c:pt>
+                <c:pt idx="1">
+                  <c:v>4.1332604885101301</c:v>
+                </c:pt>
+                <c:pt idx="2">
+                  <c:v>54.015487432479802</c:v>
+                </c:pt>
+              </c:numCache>
+            </c:numRef>
+          </c:val>
+        </c:ser>
+        <c:marker val="1"/>
+        <c:axId val="166474112"/>
         <c:axId val="146859520"/>
-      </c:barChart>
+      </c:lineChart>
       <c:catAx>
-        <c:axId val="146822272"/>
+        <c:axId val="166474112"/>
         <c:scaling>
           <c:orientation val="minMax"/>
         </c:scaling>
@@ -2215,7 +4092,7 @@
         <c:majorGridlines/>
         <c:numFmt formatCode="General" sourceLinked="1"/>
         <c:tickLblPos val="nextTo"/>
-        <c:crossAx val="146822272"/>
+        <c:crossAx val="166474112"/>
         <c:crosses val="autoZero"/>
         <c:crossBetween val="between"/>
       </c:valAx>
@@ -2242,6 +4119,7 @@
 
 <file path=ppt/charts/chart8.xml><?xml version="1.0" encoding="utf-8"?>
 <c:chartSpace xmlns:c="http://schemas.openxmlformats.org/drawingml/2006/chart" xmlns:a="http://schemas.openxmlformats.org/drawingml/2006/main" xmlns:r="http://schemas.openxmlformats.org/officeDocument/2006/relationships">
+  <c:date1904 val="1"/>
   <c:lang val="en-US"/>
   <c:chart>
     <c:title>
@@ -2261,7 +4139,7 @@
               <c:strCache>
                 <c:ptCount val="1"/>
                 <c:pt idx="0">
-                  <c:v>10^6</c:v>
+                  <c:v>10^5</c:v>
                 </c:pt>
               </c:strCache>
             </c:strRef>
@@ -2307,48 +4185,48 @@
                 <c:formatCode>General</c:formatCode>
                 <c:ptCount val="7"/>
                 <c:pt idx="0">
-                  <c:v>0.25980329513549799</c:v>
+                  <c:v>1.2348413467407201E-2</c:v>
                 </c:pt>
                 <c:pt idx="1">
-                  <c:v>2.32021784782409</c:v>
+                  <c:v>0.16510057449340798</c:v>
                 </c:pt>
                 <c:pt idx="2">
-                  <c:v>2.3022725582122798</c:v>
+                  <c:v>0.12478518486022905</c:v>
                 </c:pt>
                 <c:pt idx="3">
-                  <c:v>1.57616090774536</c:v>
+                  <c:v>8.4300994873046819E-2</c:v>
                 </c:pt>
                 <c:pt idx="4">
-                  <c:v>5.1507411003112704</c:v>
+                  <c:v>0.38062334060668901</c:v>
                 </c:pt>
                 <c:pt idx="5">
-                  <c:v>3.9369254112243599</c:v>
+                  <c:v>0.35665750503540006</c:v>
                 </c:pt>
                 <c:pt idx="6">
-                  <c:v>4.1332604885101301</c:v>
+                  <c:v>0.29847025871276806</c:v>
                 </c:pt>
               </c:numCache>
             </c:numRef>
           </c:val>
         </c:ser>
-        <c:axId val="163651968"/>
-        <c:axId val="163685120"/>
+        <c:axId val="166265600"/>
+        <c:axId val="166267520"/>
       </c:barChart>
       <c:catAx>
-        <c:axId val="163651968"/>
+        <c:axId val="166265600"/>
         <c:scaling>
           <c:orientation val="minMax"/>
         </c:scaling>
         <c:axPos val="b"/>
         <c:tickLblPos val="nextTo"/>
-        <c:crossAx val="163685120"/>
+        <c:crossAx val="166267520"/>
         <c:crosses val="autoZero"/>
         <c:auto val="1"/>
         <c:lblAlgn val="ctr"/>
         <c:lblOffset val="100"/>
       </c:catAx>
       <c:valAx>
-        <c:axId val="163685120"/>
+        <c:axId val="166267520"/>
         <c:scaling>
           <c:orientation val="minMax"/>
         </c:scaling>
@@ -2356,7 +4234,7 @@
         <c:majorGridlines/>
         <c:numFmt formatCode="General" sourceLinked="1"/>
         <c:tickLblPos val="nextTo"/>
-        <c:crossAx val="163651968"/>
+        <c:crossAx val="166265600"/>
         <c:crosses val="autoZero"/>
         <c:crossBetween val="between"/>
       </c:valAx>
@@ -2402,7 +4280,7 @@
               <c:strCache>
                 <c:ptCount val="1"/>
                 <c:pt idx="0">
-                  <c:v>10^7</c:v>
+                  <c:v>10^6</c:v>
                 </c:pt>
               </c:strCache>
             </c:strRef>
@@ -2448,48 +4326,48 @@
                 <c:formatCode>General</c:formatCode>
                 <c:ptCount val="7"/>
                 <c:pt idx="0">
-                  <c:v>3.7157714366912802</c:v>
+                  <c:v>0.25980329513549799</c:v>
                 </c:pt>
                 <c:pt idx="1">
-                  <c:v>26.2707934379577</c:v>
+                  <c:v>2.32021784782409</c:v>
                 </c:pt>
                 <c:pt idx="2">
-                  <c:v>40.795489072799597</c:v>
+                  <c:v>2.3022725582122798</c:v>
                 </c:pt>
                 <c:pt idx="3">
-                  <c:v>17.465894699096602</c:v>
+                  <c:v>1.57616090774536</c:v>
                 </c:pt>
                 <c:pt idx="4">
-                  <c:v>69.752348423004094</c:v>
+                  <c:v>5.1507411003112704</c:v>
                 </c:pt>
                 <c:pt idx="5">
-                  <c:v>53.246130228042603</c:v>
+                  <c:v>3.9369254112243599</c:v>
                 </c:pt>
                 <c:pt idx="6">
-                  <c:v>54.015487432479802</c:v>
+                  <c:v>4.1332604885101301</c:v>
                 </c:pt>
               </c:numCache>
             </c:numRef>
           </c:val>
         </c:ser>
-        <c:axId val="76137984"/>
-        <c:axId val="104691968"/>
+        <c:axId val="163651968"/>
+        <c:axId val="163685120"/>
       </c:barChart>
       <c:catAx>
-        <c:axId val="76137984"/>
+        <c:axId val="163651968"/>
         <c:scaling>
           <c:orientation val="minMax"/>
         </c:scaling>
         <c:axPos val="b"/>
         <c:tickLblPos val="nextTo"/>
-        <c:crossAx val="104691968"/>
+        <c:crossAx val="163685120"/>
         <c:crosses val="autoZero"/>
         <c:auto val="1"/>
         <c:lblAlgn val="ctr"/>
         <c:lblOffset val="100"/>
       </c:catAx>
       <c:valAx>
-        <c:axId val="104691968"/>
+        <c:axId val="163685120"/>
         <c:scaling>
           <c:orientation val="minMax"/>
         </c:scaling>
@@ -2497,7 +4375,7 @@
         <c:majorGridlines/>
         <c:numFmt formatCode="General" sourceLinked="1"/>
         <c:tickLblPos val="nextTo"/>
-        <c:crossAx val="76137984"/>
+        <c:crossAx val="163651968"/>
         <c:crosses val="autoZero"/>
         <c:crossBetween val="between"/>
       </c:valAx>
@@ -3005,6 +4883,105 @@
             <a:fld id="{58865A00-C43C-46BF-BB5C-3869D5812E06}" type="slidenum">
               <a:rPr lang="en-US" smtClean="0"/>
               <a:t>2</a:t>
+            </a:fld>
+            <a:endParaRPr lang="en-US"/>
+          </a:p>
+        </p:txBody>
+      </p:sp>
+    </p:spTree>
+  </p:cSld>
+  <p:clrMapOvr>
+    <a:masterClrMapping/>
+  </p:clrMapOvr>
+</p:notes>
+</file>
+
+<file path=ppt/notesSlides/notesSlide2.xml><?xml version="1.0" encoding="utf-8"?>
+<p:notes xmlns:a="http://schemas.openxmlformats.org/drawingml/2006/main" xmlns:r="http://schemas.openxmlformats.org/officeDocument/2006/relationships" xmlns:p="http://schemas.openxmlformats.org/presentationml/2006/main">
+  <p:cSld>
+    <p:spTree>
+      <p:nvGrpSpPr>
+        <p:cNvPr id="1" name=""/>
+        <p:cNvGrpSpPr/>
+        <p:nvPr/>
+      </p:nvGrpSpPr>
+      <p:grpSpPr>
+        <a:xfrm>
+          <a:off x="0" y="0"/>
+          <a:ext cx="0" cy="0"/>
+          <a:chOff x="0" y="0"/>
+          <a:chExt cx="0" cy="0"/>
+        </a:xfrm>
+      </p:grpSpPr>
+      <p:sp>
+        <p:nvSpPr>
+          <p:cNvPr id="2" name="Slide Image Placeholder 1"/>
+          <p:cNvSpPr>
+            <a:spLocks noGrp="1" noRot="1" noChangeAspect="1"/>
+          </p:cNvSpPr>
+          <p:nvPr>
+            <p:ph type="sldImg"/>
+          </p:nvPr>
+        </p:nvSpPr>
+        <p:spPr/>
+      </p:sp>
+      <p:sp>
+        <p:nvSpPr>
+          <p:cNvPr id="3" name="Notes Placeholder 2"/>
+          <p:cNvSpPr>
+            <a:spLocks noGrp="1"/>
+          </p:cNvSpPr>
+          <p:nvPr>
+            <p:ph type="body" idx="1"/>
+          </p:nvPr>
+        </p:nvSpPr>
+        <p:spPr/>
+        <p:txBody>
+          <a:bodyPr>
+            <a:normAutofit/>
+          </a:bodyPr>
+          <a:lstStyle/>
+          <a:p>
+            <a:r>
+              <a:rPr lang="ro-RO" dirty="0" smtClean="0"/>
+              <a:t>Obs:</a:t>
+            </a:r>
+            <a:r>
+              <a:rPr lang="ro-RO" baseline="0" dirty="0" smtClean="0"/>
+              <a:t> </a:t>
+            </a:r>
+          </a:p>
+          <a:p>
+            <a:r>
+              <a:rPr lang="ro-RO" dirty="0" smtClean="0"/>
+              <a:t>Shell Sort se descurca super</a:t>
+            </a:r>
+            <a:r>
+              <a:rPr lang="ro-RO" baseline="0" dirty="0" smtClean="0"/>
+              <a:t> bine cand e vorba de vectori aproape sortati.</a:t>
+            </a:r>
+            <a:endParaRPr lang="en-US" dirty="0"/>
+          </a:p>
+        </p:txBody>
+      </p:sp>
+      <p:sp>
+        <p:nvSpPr>
+          <p:cNvPr id="4" name="Slide Number Placeholder 3"/>
+          <p:cNvSpPr>
+            <a:spLocks noGrp="1"/>
+          </p:cNvSpPr>
+          <p:nvPr>
+            <p:ph type="sldNum" sz="quarter" idx="10"/>
+          </p:nvPr>
+        </p:nvSpPr>
+        <p:spPr/>
+        <p:txBody>
+          <a:bodyPr/>
+          <a:lstStyle/>
+          <a:p>
+            <a:fld id="{58865A00-C43C-46BF-BB5C-3869D5812E06}" type="slidenum">
+              <a:rPr lang="en-US" smtClean="0"/>
+              <a:t>3</a:t>
             </a:fld>
             <a:endParaRPr lang="en-US"/>
           </a:p>
@@ -6003,6 +7980,93 @@
           </a:p>
         </p:txBody>
       </p:sp>
+      <p:sp>
+        <p:nvSpPr>
+          <p:cNvPr id="6" name="Subtitle 2"/>
+          <p:cNvSpPr txBox="1">
+            <a:spLocks/>
+          </p:cNvSpPr>
+          <p:nvPr/>
+        </p:nvSpPr>
+        <p:spPr>
+          <a:xfrm>
+            <a:off x="1295400" y="5334000"/>
+            <a:ext cx="6400800" cy="1752600"/>
+          </a:xfrm>
+          <a:prstGeom prst="rect">
+            <a:avLst/>
+          </a:prstGeom>
+        </p:spPr>
+        <p:txBody>
+          <a:bodyPr vert="horz" lIns="91440" tIns="45720" rIns="91440" bIns="45720" rtlCol="0">
+            <a:normAutofit/>
+          </a:bodyPr>
+          <a:lstStyle/>
+          <a:p>
+            <a:pPr marL="0" marR="0" lvl="0" indent="0" algn="ctr" defTabSz="914400" rtl="0" eaLnBrk="1" fontAlgn="auto" latinLnBrk="0" hangingPunct="1">
+              <a:lnSpc>
+                <a:spcPct val="100000"/>
+              </a:lnSpc>
+              <a:spcBef>
+                <a:spcPct val="20000"/>
+              </a:spcBef>
+              <a:spcAft>
+                <a:spcPts val="0"/>
+              </a:spcAft>
+              <a:buClrTx/>
+              <a:buSzTx/>
+              <a:buFont typeface="Arial" pitchFamily="34" charset="0"/>
+              <a:buNone/>
+              <a:tabLst/>
+              <a:defRPr/>
+            </a:pPr>
+            <a:r>
+              <a:rPr lang="ro-RO" sz="1400" dirty="0" smtClean="0">
+                <a:solidFill>
+                  <a:schemeClr val="bg2">
+                    <a:lumMod val="50000"/>
+                  </a:schemeClr>
+                </a:solidFill>
+              </a:rPr>
+              <a:t>Iulia-Georgiana Talpalariu- Grupa 134</a:t>
+            </a:r>
+          </a:p>
+          <a:p>
+            <a:pPr lvl="0" algn="ctr">
+              <a:spcBef>
+                <a:spcPct val="20000"/>
+              </a:spcBef>
+            </a:pPr>
+            <a:r>
+              <a:rPr lang="ro-RO" sz="1400" dirty="0" smtClean="0">
+                <a:solidFill>
+                  <a:schemeClr val="tx1">
+                    <a:tint val="75000"/>
+                  </a:schemeClr>
+                </a:solidFill>
+                <a:hlinkClick r:id="rId2"/>
+              </a:rPr>
+              <a:t>https://github.com/iuliali/sorting-algo-project </a:t>
+            </a:r>
+            <a:endParaRPr kumimoji="0" lang="en-US" sz="1400" b="0" i="0" u="none" strike="noStrike" kern="1200" cap="none" spc="0" normalizeH="0" baseline="0" noProof="0" dirty="0" smtClean="0">
+              <a:ln>
+                <a:noFill/>
+              </a:ln>
+              <a:solidFill>
+                <a:schemeClr val="tx1">
+                  <a:tint val="75000"/>
+                </a:schemeClr>
+              </a:solidFill>
+              <a:effectLst/>
+              <a:uLnTx/>
+              <a:uFillTx/>
+              <a:latin typeface="+mn-lt"/>
+              <a:ea typeface="+mn-ea"/>
+              <a:cs typeface="+mn-cs"/>
+            </a:endParaRPr>
+          </a:p>
+        </p:txBody>
+      </p:sp>
     </p:spTree>
   </p:cSld>
   <p:clrMapOvr>
@@ -6012,7 +8076,7 @@
 </file>
 
 <file path=ppt/slides/slide10.xml><?xml version="1.0" encoding="utf-8"?>
-<p:sld xmlns:a="http://schemas.openxmlformats.org/drawingml/2006/main" xmlns:r="http://schemas.openxmlformats.org/officeDocument/2006/relationships" xmlns:p="http://schemas.openxmlformats.org/presentationml/2006/main">
+<p:sld xmlns:a="http://schemas.openxmlformats.org/drawingml/2006/main" xmlns:r="http://schemas.openxmlformats.org/officeDocument/2006/relationships" xmlns:p="http://schemas.openxmlformats.org/presentationml/2006/main" show="0">
   <p:cSld>
     <p:spTree>
       <p:nvGrpSpPr>
@@ -6165,7 +8229,7 @@
               <a:t>10</a:t>
             </a:r>
             <a:r>
-              <a:rPr lang="en-US" b="1" u="sng" baseline="30000" dirty="0"/>
+              <a:rPr lang="en-US" b="1" u="sng" baseline="30000" dirty="0" smtClean="0"/>
               <a:t>8</a:t>
             </a:r>
             <a:endParaRPr lang="ro-RO" b="1" u="sng" dirty="0" smtClean="0"/>
@@ -6177,11 +8241,12 @@
   <p:clrMapOvr>
     <a:masterClrMapping/>
   </p:clrMapOvr>
+  <p:transition/>
 </p:sld>
 </file>
 
 <file path=ppt/slides/slide11.xml><?xml version="1.0" encoding="utf-8"?>
-<p:sld xmlns:a="http://schemas.openxmlformats.org/drawingml/2006/main" xmlns:r="http://schemas.openxmlformats.org/officeDocument/2006/relationships" xmlns:p="http://schemas.openxmlformats.org/presentationml/2006/main">
+<p:sld xmlns:a="http://schemas.openxmlformats.org/drawingml/2006/main" xmlns:r="http://schemas.openxmlformats.org/officeDocument/2006/relationships" xmlns:p="http://schemas.openxmlformats.org/presentationml/2006/main" show="0">
   <p:cSld>
     <p:spTree>
       <p:nvGrpSpPr>
@@ -6338,6 +8403,1002 @@
               <a:t>8</a:t>
             </a:r>
             <a:endParaRPr lang="ro-RO" b="1" u="sng" dirty="0" smtClean="0"/>
+          </a:p>
+        </p:txBody>
+      </p:sp>
+    </p:spTree>
+  </p:cSld>
+  <p:clrMapOvr>
+    <a:masterClrMapping/>
+  </p:clrMapOvr>
+  <p:transition/>
+</p:sld>
+</file>
+
+<file path=ppt/slides/slide12.xml><?xml version="1.0" encoding="utf-8"?>
+<p:sld xmlns:a="http://schemas.openxmlformats.org/drawingml/2006/main" xmlns:r="http://schemas.openxmlformats.org/officeDocument/2006/relationships" xmlns:p="http://schemas.openxmlformats.org/presentationml/2006/main" show="0">
+  <p:cSld>
+    <p:spTree>
+      <p:nvGrpSpPr>
+        <p:cNvPr id="1" name=""/>
+        <p:cNvGrpSpPr/>
+        <p:nvPr/>
+      </p:nvGrpSpPr>
+      <p:grpSpPr>
+        <a:xfrm>
+          <a:off x="0" y="0"/>
+          <a:ext cx="0" cy="0"/>
+          <a:chOff x="0" y="0"/>
+          <a:chExt cx="0" cy="0"/>
+        </a:xfrm>
+      </p:grpSpPr>
+      <p:sp>
+        <p:nvSpPr>
+          <p:cNvPr id="2" name="Title 1"/>
+          <p:cNvSpPr>
+            <a:spLocks noGrp="1"/>
+          </p:cNvSpPr>
+          <p:nvPr>
+            <p:ph type="title"/>
+          </p:nvPr>
+        </p:nvSpPr>
+        <p:spPr>
+          <a:xfrm>
+            <a:off x="381000" y="0"/>
+            <a:ext cx="8229600" cy="1143000"/>
+          </a:xfrm>
+        </p:spPr>
+        <p:txBody>
+          <a:bodyPr>
+            <a:normAutofit fontScale="90000"/>
+          </a:bodyPr>
+          <a:lstStyle/>
+          <a:p>
+            <a:r>
+              <a:rPr lang="en-US" sz="3600" dirty="0" err="1" smtClean="0"/>
+              <a:t>Rulare</a:t>
+            </a:r>
+            <a:r>
+              <a:rPr lang="en-US" sz="3600" dirty="0" smtClean="0"/>
+              <a:t> </a:t>
+            </a:r>
+            <a:r>
+              <a:rPr lang="en-US" sz="3600" dirty="0" err="1" smtClean="0"/>
+              <a:t>comparativa</a:t>
+            </a:r>
+            <a:r>
+              <a:rPr lang="en-US" sz="3600" dirty="0" smtClean="0"/>
+              <a:t> input </a:t>
+            </a:r>
+            <a:r>
+              <a:rPr lang="en-US" sz="3600" dirty="0" err="1" smtClean="0"/>
+              <a:t>aleatoriu</a:t>
+            </a:r>
+            <a:r>
+              <a:rPr lang="en-US" sz="3600" dirty="0" smtClean="0"/>
+              <a:t> – </a:t>
+            </a:r>
+            <a:r>
+              <a:rPr lang="en-US" sz="3600" dirty="0" err="1" smtClean="0"/>
+              <a:t>variatia</a:t>
+            </a:r>
+            <a:r>
+              <a:rPr lang="en-US" sz="3600" dirty="0" smtClean="0"/>
+              <a:t> </a:t>
+            </a:r>
+            <a:r>
+              <a:rPr lang="en-US" sz="3600" dirty="0" err="1" smtClean="0"/>
+              <a:t>timpului</a:t>
+            </a:r>
+            <a:r>
+              <a:rPr lang="en-US" sz="3600" dirty="0" smtClean="0"/>
+              <a:t> cu </a:t>
+            </a:r>
+            <a:r>
+              <a:rPr lang="en-US" sz="3600" dirty="0" err="1" smtClean="0"/>
+              <a:t>cresterea</a:t>
+            </a:r>
+            <a:r>
+              <a:rPr lang="en-US" sz="3600" dirty="0" smtClean="0"/>
+              <a:t> </a:t>
+            </a:r>
+            <a:r>
+              <a:rPr lang="en-US" sz="3600" dirty="0" err="1" smtClean="0"/>
+              <a:t>numarului</a:t>
+            </a:r>
+            <a:r>
+              <a:rPr lang="en-US" sz="3600" dirty="0" smtClean="0"/>
+              <a:t> de </a:t>
+            </a:r>
+            <a:r>
+              <a:rPr lang="en-US" sz="3600" dirty="0" err="1" smtClean="0"/>
+              <a:t>elemente</a:t>
+            </a:r>
+            <a:endParaRPr lang="en-US" sz="3600" dirty="0"/>
+          </a:p>
+        </p:txBody>
+      </p:sp>
+      <p:graphicFrame>
+        <p:nvGraphicFramePr>
+          <p:cNvPr id="4" name="Content Placeholder 3"/>
+          <p:cNvGraphicFramePr>
+            <a:graphicFrameLocks noGrp="1"/>
+          </p:cNvGraphicFramePr>
+          <p:nvPr>
+            <p:ph idx="1"/>
+          </p:nvPr>
+        </p:nvGraphicFramePr>
+        <p:xfrm>
+          <a:off x="457200" y="1600200"/>
+          <a:ext cx="8229600" cy="4525963"/>
+        </p:xfrm>
+        <a:graphic>
+          <a:graphicData uri="http://schemas.openxmlformats.org/drawingml/2006/chart">
+            <c:chart xmlns:c="http://schemas.openxmlformats.org/drawingml/2006/chart" xmlns:r="http://schemas.openxmlformats.org/officeDocument/2006/relationships" r:id="rId2"/>
+          </a:graphicData>
+        </a:graphic>
+      </p:graphicFrame>
+      <p:sp>
+        <p:nvSpPr>
+          <p:cNvPr id="5" name="TextBox 4"/>
+          <p:cNvSpPr txBox="1"/>
+          <p:nvPr/>
+        </p:nvSpPr>
+        <p:spPr>
+          <a:xfrm>
+            <a:off x="533400" y="990600"/>
+            <a:ext cx="3505200" cy="369332"/>
+          </a:xfrm>
+          <a:prstGeom prst="rect">
+            <a:avLst/>
+          </a:prstGeom>
+          <a:noFill/>
+        </p:spPr>
+        <p:txBody>
+          <a:bodyPr wrap="square" rtlCol="0">
+            <a:spAutoFit/>
+          </a:bodyPr>
+          <a:lstStyle/>
+          <a:p>
+            <a:r>
+              <a:rPr lang="en-US" b="1" u="sng" dirty="0" smtClean="0"/>
+              <a:t>MAX =</a:t>
+            </a:r>
+            <a:r>
+              <a:rPr lang="ro-RO" b="1" u="sng" dirty="0" smtClean="0"/>
+              <a:t>10</a:t>
+            </a:r>
+            <a:r>
+              <a:rPr lang="en-US" b="1" u="sng" baseline="30000" dirty="0"/>
+              <a:t>8</a:t>
+            </a:r>
+            <a:endParaRPr lang="ro-RO" b="1" u="sng" dirty="0" smtClean="0"/>
+          </a:p>
+        </p:txBody>
+      </p:sp>
+    </p:spTree>
+  </p:cSld>
+  <p:clrMapOvr>
+    <a:masterClrMapping/>
+  </p:clrMapOvr>
+  <p:transition/>
+</p:sld>
+</file>
+
+<file path=ppt/slides/slide13.xml><?xml version="1.0" encoding="utf-8"?>
+<p:sld xmlns:a="http://schemas.openxmlformats.org/drawingml/2006/main" xmlns:r="http://schemas.openxmlformats.org/officeDocument/2006/relationships" xmlns:p="http://schemas.openxmlformats.org/presentationml/2006/main">
+  <p:cSld>
+    <p:spTree>
+      <p:nvGrpSpPr>
+        <p:cNvPr id="1" name=""/>
+        <p:cNvGrpSpPr/>
+        <p:nvPr/>
+      </p:nvGrpSpPr>
+      <p:grpSpPr>
+        <a:xfrm>
+          <a:off x="0" y="0"/>
+          <a:ext cx="0" cy="0"/>
+          <a:chOff x="0" y="0"/>
+          <a:chExt cx="0" cy="0"/>
+        </a:xfrm>
+      </p:grpSpPr>
+      <p:sp>
+        <p:nvSpPr>
+          <p:cNvPr id="2" name="Title 1"/>
+          <p:cNvSpPr>
+            <a:spLocks noGrp="1"/>
+          </p:cNvSpPr>
+          <p:nvPr>
+            <p:ph type="title"/>
+          </p:nvPr>
+        </p:nvSpPr>
+        <p:spPr>
+          <a:xfrm>
+            <a:off x="381000" y="0"/>
+            <a:ext cx="8763000" cy="1143000"/>
+          </a:xfrm>
+        </p:spPr>
+        <p:txBody>
+          <a:bodyPr>
+            <a:normAutofit fontScale="90000"/>
+          </a:bodyPr>
+          <a:lstStyle/>
+          <a:p>
+            <a:r>
+              <a:rPr lang="en-US" sz="3600" b="1" dirty="0" smtClean="0"/>
+              <a:t>Shell Sort</a:t>
+            </a:r>
+            <a:r>
+              <a:rPr lang="en-US" sz="3600" dirty="0" smtClean="0"/>
+              <a:t/>
+            </a:r>
+            <a:br>
+              <a:rPr lang="en-US" sz="3600" dirty="0" smtClean="0"/>
+            </a:br>
+            <a:r>
+              <a:rPr lang="en-US" sz="3600" dirty="0" err="1" smtClean="0"/>
+              <a:t>Rulare</a:t>
+            </a:r>
+            <a:r>
+              <a:rPr lang="en-US" sz="3600" dirty="0" smtClean="0"/>
+              <a:t> </a:t>
+            </a:r>
+            <a:r>
+              <a:rPr lang="en-US" sz="3600" dirty="0" err="1" smtClean="0"/>
+              <a:t>comparativ</a:t>
+            </a:r>
+            <a:r>
+              <a:rPr lang="ro-RO" sz="3600" dirty="0" smtClean="0"/>
+              <a:t>ă cu secvente de gap-uri diferite</a:t>
+            </a:r>
+            <a:endParaRPr lang="en-US" sz="3600" dirty="0"/>
+          </a:p>
+        </p:txBody>
+      </p:sp>
+      <p:graphicFrame>
+        <p:nvGraphicFramePr>
+          <p:cNvPr id="4" name="Content Placeholder 3"/>
+          <p:cNvGraphicFramePr>
+            <a:graphicFrameLocks noGrp="1"/>
+          </p:cNvGraphicFramePr>
+          <p:nvPr>
+            <p:ph idx="1"/>
+          </p:nvPr>
+        </p:nvGraphicFramePr>
+        <p:xfrm>
+          <a:off x="457200" y="1600201"/>
+          <a:ext cx="8305800" cy="4191000"/>
+        </p:xfrm>
+        <a:graphic>
+          <a:graphicData uri="http://schemas.openxmlformats.org/drawingml/2006/chart">
+            <c:chart xmlns:c="http://schemas.openxmlformats.org/drawingml/2006/chart" xmlns:r="http://schemas.openxmlformats.org/officeDocument/2006/relationships" r:id="rId2"/>
+          </a:graphicData>
+        </a:graphic>
+      </p:graphicFrame>
+      <p:sp>
+        <p:nvSpPr>
+          <p:cNvPr id="5" name="TextBox 4"/>
+          <p:cNvSpPr txBox="1"/>
+          <p:nvPr/>
+        </p:nvSpPr>
+        <p:spPr>
+          <a:xfrm>
+            <a:off x="533400" y="990600"/>
+            <a:ext cx="3505200" cy="369332"/>
+          </a:xfrm>
+          <a:prstGeom prst="rect">
+            <a:avLst/>
+          </a:prstGeom>
+          <a:noFill/>
+        </p:spPr>
+        <p:txBody>
+          <a:bodyPr wrap="square" rtlCol="0">
+            <a:spAutoFit/>
+          </a:bodyPr>
+          <a:lstStyle/>
+          <a:p>
+            <a:r>
+              <a:rPr lang="ro-RO" b="1" u="sng" dirty="0" smtClean="0"/>
+              <a:t>N=10^6</a:t>
+            </a:r>
+          </a:p>
+        </p:txBody>
+      </p:sp>
+      <p:sp>
+        <p:nvSpPr>
+          <p:cNvPr id="6" name="Rectangle 5"/>
+          <p:cNvSpPr/>
+          <p:nvPr/>
+        </p:nvSpPr>
+        <p:spPr>
+          <a:xfrm>
+            <a:off x="609600" y="5791200"/>
+            <a:ext cx="7053085" cy="369332"/>
+          </a:xfrm>
+          <a:prstGeom prst="rect">
+            <a:avLst/>
+          </a:prstGeom>
+        </p:spPr>
+        <p:txBody>
+          <a:bodyPr wrap="none">
+            <a:spAutoFit/>
+          </a:bodyPr>
+          <a:lstStyle/>
+          <a:p>
+            <a:pPr>
+              <a:buFont typeface="Arial" pitchFamily="34" charset="0"/>
+              <a:buChar char="•"/>
+            </a:pPr>
+            <a:r>
+              <a:rPr lang="ro-RO" b="1" dirty="0" smtClean="0"/>
+              <a:t> Observăm că timpii cei mai buni sunt pentru secventa lui Marcin Ciura.</a:t>
+            </a:r>
+            <a:endParaRPr lang="en-US" b="1" dirty="0"/>
+          </a:p>
+        </p:txBody>
+      </p:sp>
+    </p:spTree>
+  </p:cSld>
+  <p:clrMapOvr>
+    <a:masterClrMapping/>
+  </p:clrMapOvr>
+</p:sld>
+</file>
+
+<file path=ppt/slides/slide14.xml><?xml version="1.0" encoding="utf-8"?>
+<p:sld xmlns:a="http://schemas.openxmlformats.org/drawingml/2006/main" xmlns:r="http://schemas.openxmlformats.org/officeDocument/2006/relationships" xmlns:p="http://schemas.openxmlformats.org/presentationml/2006/main">
+  <p:cSld>
+    <p:spTree>
+      <p:nvGrpSpPr>
+        <p:cNvPr id="1" name=""/>
+        <p:cNvGrpSpPr/>
+        <p:nvPr/>
+      </p:nvGrpSpPr>
+      <p:grpSpPr>
+        <a:xfrm>
+          <a:off x="0" y="0"/>
+          <a:ext cx="0" cy="0"/>
+          <a:chOff x="0" y="0"/>
+          <a:chExt cx="0" cy="0"/>
+        </a:xfrm>
+      </p:grpSpPr>
+      <p:sp>
+        <p:nvSpPr>
+          <p:cNvPr id="2" name="Title 1"/>
+          <p:cNvSpPr>
+            <a:spLocks noGrp="1"/>
+          </p:cNvSpPr>
+          <p:nvPr>
+            <p:ph type="title"/>
+          </p:nvPr>
+        </p:nvSpPr>
+        <p:spPr>
+          <a:xfrm>
+            <a:off x="381000" y="0"/>
+            <a:ext cx="8763000" cy="1143000"/>
+          </a:xfrm>
+        </p:spPr>
+        <p:txBody>
+          <a:bodyPr>
+            <a:normAutofit fontScale="90000"/>
+          </a:bodyPr>
+          <a:lstStyle/>
+          <a:p>
+            <a:r>
+              <a:rPr lang="en-US" sz="3600" b="1" dirty="0" smtClean="0"/>
+              <a:t>Shell Sort</a:t>
+            </a:r>
+            <a:r>
+              <a:rPr lang="en-US" sz="3600" dirty="0" smtClean="0"/>
+              <a:t/>
+            </a:r>
+            <a:br>
+              <a:rPr lang="en-US" sz="3600" dirty="0" smtClean="0"/>
+            </a:br>
+            <a:r>
+              <a:rPr lang="en-US" sz="3600" dirty="0" err="1" smtClean="0"/>
+              <a:t>Rulare</a:t>
+            </a:r>
+            <a:r>
+              <a:rPr lang="en-US" sz="3600" dirty="0" smtClean="0"/>
+              <a:t> </a:t>
+            </a:r>
+            <a:r>
+              <a:rPr lang="en-US" sz="3600" dirty="0" err="1" smtClean="0"/>
+              <a:t>comparativ</a:t>
+            </a:r>
+            <a:r>
+              <a:rPr lang="ro-RO" sz="3600" dirty="0" smtClean="0"/>
+              <a:t>ă cu secvente de gap-uri diferite</a:t>
+            </a:r>
+            <a:endParaRPr lang="en-US" sz="3600" dirty="0"/>
+          </a:p>
+        </p:txBody>
+      </p:sp>
+      <p:graphicFrame>
+        <p:nvGraphicFramePr>
+          <p:cNvPr id="4" name="Content Placeholder 3"/>
+          <p:cNvGraphicFramePr>
+            <a:graphicFrameLocks noGrp="1"/>
+          </p:cNvGraphicFramePr>
+          <p:nvPr>
+            <p:ph idx="1"/>
+          </p:nvPr>
+        </p:nvGraphicFramePr>
+        <p:xfrm>
+          <a:off x="457200" y="1600200"/>
+          <a:ext cx="8229600" cy="4525963"/>
+        </p:xfrm>
+        <a:graphic>
+          <a:graphicData uri="http://schemas.openxmlformats.org/drawingml/2006/chart">
+            <c:chart xmlns:c="http://schemas.openxmlformats.org/drawingml/2006/chart" xmlns:r="http://schemas.openxmlformats.org/officeDocument/2006/relationships" r:id="rId2"/>
+          </a:graphicData>
+        </a:graphic>
+      </p:graphicFrame>
+      <p:sp>
+        <p:nvSpPr>
+          <p:cNvPr id="5" name="TextBox 4"/>
+          <p:cNvSpPr txBox="1"/>
+          <p:nvPr/>
+        </p:nvSpPr>
+        <p:spPr>
+          <a:xfrm>
+            <a:off x="533400" y="990600"/>
+            <a:ext cx="3505200" cy="369332"/>
+          </a:xfrm>
+          <a:prstGeom prst="rect">
+            <a:avLst/>
+          </a:prstGeom>
+          <a:noFill/>
+        </p:spPr>
+        <p:txBody>
+          <a:bodyPr wrap="square" rtlCol="0">
+            <a:spAutoFit/>
+          </a:bodyPr>
+          <a:lstStyle/>
+          <a:p>
+            <a:r>
+              <a:rPr lang="ro-RO" b="1" u="sng" dirty="0" smtClean="0"/>
+              <a:t>N=10^7</a:t>
+            </a:r>
+          </a:p>
+        </p:txBody>
+      </p:sp>
+      <p:sp>
+        <p:nvSpPr>
+          <p:cNvPr id="6" name="Rectangle 5"/>
+          <p:cNvSpPr/>
+          <p:nvPr/>
+        </p:nvSpPr>
+        <p:spPr>
+          <a:xfrm>
+            <a:off x="609600" y="6019800"/>
+            <a:ext cx="7053085" cy="369332"/>
+          </a:xfrm>
+          <a:prstGeom prst="rect">
+            <a:avLst/>
+          </a:prstGeom>
+        </p:spPr>
+        <p:txBody>
+          <a:bodyPr wrap="none">
+            <a:spAutoFit/>
+          </a:bodyPr>
+          <a:lstStyle/>
+          <a:p>
+            <a:pPr>
+              <a:buFont typeface="Arial" pitchFamily="34" charset="0"/>
+              <a:buChar char="•"/>
+            </a:pPr>
+            <a:r>
+              <a:rPr lang="ro-RO" b="1" dirty="0" smtClean="0"/>
+              <a:t> Observăm că timpii cei mai buni sunt pentru secventa lui Marcin Ciura.</a:t>
+            </a:r>
+            <a:endParaRPr lang="en-US" b="1" dirty="0"/>
+          </a:p>
+        </p:txBody>
+      </p:sp>
+    </p:spTree>
+  </p:cSld>
+  <p:clrMapOvr>
+    <a:masterClrMapping/>
+  </p:clrMapOvr>
+</p:sld>
+</file>
+
+<file path=ppt/slides/slide15.xml><?xml version="1.0" encoding="utf-8"?>
+<p:sld xmlns:a="http://schemas.openxmlformats.org/drawingml/2006/main" xmlns:r="http://schemas.openxmlformats.org/officeDocument/2006/relationships" xmlns:p="http://schemas.openxmlformats.org/presentationml/2006/main" show="0">
+  <p:cSld>
+    <p:spTree>
+      <p:nvGrpSpPr>
+        <p:cNvPr id="1" name=""/>
+        <p:cNvGrpSpPr/>
+        <p:nvPr/>
+      </p:nvGrpSpPr>
+      <p:grpSpPr>
+        <a:xfrm>
+          <a:off x="0" y="0"/>
+          <a:ext cx="0" cy="0"/>
+          <a:chOff x="0" y="0"/>
+          <a:chExt cx="0" cy="0"/>
+        </a:xfrm>
+      </p:grpSpPr>
+      <p:sp>
+        <p:nvSpPr>
+          <p:cNvPr id="2" name="Title 1"/>
+          <p:cNvSpPr>
+            <a:spLocks noGrp="1"/>
+          </p:cNvSpPr>
+          <p:nvPr>
+            <p:ph type="title"/>
+          </p:nvPr>
+        </p:nvSpPr>
+        <p:spPr>
+          <a:xfrm>
+            <a:off x="381000" y="0"/>
+            <a:ext cx="8229600" cy="1143000"/>
+          </a:xfrm>
+        </p:spPr>
+        <p:txBody>
+          <a:bodyPr>
+            <a:normAutofit fontScale="90000"/>
+          </a:bodyPr>
+          <a:lstStyle/>
+          <a:p>
+            <a:r>
+              <a:rPr lang="en-US" sz="3600" dirty="0" smtClean="0"/>
+              <a:t>Shell Sort</a:t>
+            </a:r>
+            <a:br>
+              <a:rPr lang="en-US" sz="3600" dirty="0" smtClean="0"/>
+            </a:br>
+            <a:r>
+              <a:rPr lang="en-US" sz="3600" dirty="0" err="1" smtClean="0"/>
+              <a:t>Rulare</a:t>
+            </a:r>
+            <a:r>
+              <a:rPr lang="en-US" sz="3600" dirty="0" smtClean="0"/>
+              <a:t> </a:t>
+            </a:r>
+            <a:r>
+              <a:rPr lang="en-US" sz="3600" dirty="0" err="1" smtClean="0"/>
+              <a:t>comparativ</a:t>
+            </a:r>
+            <a:r>
+              <a:rPr lang="ro-RO" sz="3600" dirty="0" smtClean="0"/>
+              <a:t>ă</a:t>
+            </a:r>
+            <a:endParaRPr lang="en-US" sz="3600" dirty="0"/>
+          </a:p>
+        </p:txBody>
+      </p:sp>
+      <p:graphicFrame>
+        <p:nvGraphicFramePr>
+          <p:cNvPr id="4" name="Content Placeholder 3"/>
+          <p:cNvGraphicFramePr>
+            <a:graphicFrameLocks noGrp="1"/>
+          </p:cNvGraphicFramePr>
+          <p:nvPr>
+            <p:ph idx="1"/>
+          </p:nvPr>
+        </p:nvGraphicFramePr>
+        <p:xfrm>
+          <a:off x="457200" y="1600200"/>
+          <a:ext cx="8229600" cy="4525963"/>
+        </p:xfrm>
+        <a:graphic>
+          <a:graphicData uri="http://schemas.openxmlformats.org/drawingml/2006/chart">
+            <c:chart xmlns:c="http://schemas.openxmlformats.org/drawingml/2006/chart" xmlns:r="http://schemas.openxmlformats.org/officeDocument/2006/relationships" r:id="rId2"/>
+          </a:graphicData>
+        </a:graphic>
+      </p:graphicFrame>
+      <p:sp>
+        <p:nvSpPr>
+          <p:cNvPr id="5" name="TextBox 4"/>
+          <p:cNvSpPr txBox="1"/>
+          <p:nvPr/>
+        </p:nvSpPr>
+        <p:spPr>
+          <a:xfrm>
+            <a:off x="533400" y="990600"/>
+            <a:ext cx="3505200" cy="369332"/>
+          </a:xfrm>
+          <a:prstGeom prst="rect">
+            <a:avLst/>
+          </a:prstGeom>
+          <a:noFill/>
+        </p:spPr>
+        <p:txBody>
+          <a:bodyPr wrap="square" rtlCol="0">
+            <a:spAutoFit/>
+          </a:bodyPr>
+          <a:lstStyle/>
+          <a:p>
+            <a:r>
+              <a:rPr lang="ro-RO" b="1" u="sng" dirty="0" smtClean="0"/>
+              <a:t>N=10^6</a:t>
+            </a:r>
+          </a:p>
+        </p:txBody>
+      </p:sp>
+    </p:spTree>
+  </p:cSld>
+  <p:clrMapOvr>
+    <a:masterClrMapping/>
+  </p:clrMapOvr>
+  <p:transition/>
+</p:sld>
+</file>
+
+<file path=ppt/slides/slide16.xml><?xml version="1.0" encoding="utf-8"?>
+<p:sld xmlns:a="http://schemas.openxmlformats.org/drawingml/2006/main" xmlns:r="http://schemas.openxmlformats.org/officeDocument/2006/relationships" xmlns:p="http://schemas.openxmlformats.org/presentationml/2006/main">
+  <p:cSld>
+    <p:spTree>
+      <p:nvGrpSpPr>
+        <p:cNvPr id="1" name=""/>
+        <p:cNvGrpSpPr/>
+        <p:nvPr/>
+      </p:nvGrpSpPr>
+      <p:grpSpPr>
+        <a:xfrm>
+          <a:off x="0" y="0"/>
+          <a:ext cx="0" cy="0"/>
+          <a:chOff x="0" y="0"/>
+          <a:chExt cx="0" cy="0"/>
+        </a:xfrm>
+      </p:grpSpPr>
+      <p:sp>
+        <p:nvSpPr>
+          <p:cNvPr id="2" name="Title 1"/>
+          <p:cNvSpPr>
+            <a:spLocks noGrp="1"/>
+          </p:cNvSpPr>
+          <p:nvPr>
+            <p:ph type="title"/>
+          </p:nvPr>
+        </p:nvSpPr>
+        <p:spPr>
+          <a:xfrm>
+            <a:off x="381000" y="0"/>
+            <a:ext cx="8229600" cy="1143000"/>
+          </a:xfrm>
+        </p:spPr>
+        <p:txBody>
+          <a:bodyPr>
+            <a:normAutofit fontScale="90000"/>
+          </a:bodyPr>
+          <a:lstStyle/>
+          <a:p>
+            <a:r>
+              <a:rPr lang="en-US" sz="3600" b="1" dirty="0" smtClean="0"/>
+              <a:t>Shell Sort</a:t>
+            </a:r>
+            <a:r>
+              <a:rPr lang="en-US" sz="3600" dirty="0" smtClean="0"/>
+              <a:t/>
+            </a:r>
+            <a:br>
+              <a:rPr lang="en-US" sz="3600" dirty="0" smtClean="0"/>
+            </a:br>
+            <a:r>
+              <a:rPr lang="en-US" sz="3600" dirty="0" err="1" smtClean="0"/>
+              <a:t>Rulare</a:t>
+            </a:r>
+            <a:r>
+              <a:rPr lang="en-US" sz="3600" dirty="0" smtClean="0"/>
+              <a:t> </a:t>
+            </a:r>
+            <a:r>
+              <a:rPr lang="en-US" sz="3600" dirty="0" err="1" smtClean="0"/>
+              <a:t>comparativ</a:t>
+            </a:r>
+            <a:r>
+              <a:rPr lang="ro-RO" sz="3600" dirty="0" smtClean="0"/>
+              <a:t>ă</a:t>
+            </a:r>
+            <a:endParaRPr lang="en-US" sz="3600" dirty="0"/>
+          </a:p>
+        </p:txBody>
+      </p:sp>
+      <p:graphicFrame>
+        <p:nvGraphicFramePr>
+          <p:cNvPr id="4" name="Content Placeholder 3"/>
+          <p:cNvGraphicFramePr>
+            <a:graphicFrameLocks noGrp="1"/>
+          </p:cNvGraphicFramePr>
+          <p:nvPr>
+            <p:ph idx="1"/>
+          </p:nvPr>
+        </p:nvGraphicFramePr>
+        <p:xfrm>
+          <a:off x="457200" y="1600200"/>
+          <a:ext cx="8229600" cy="4525963"/>
+        </p:xfrm>
+        <a:graphic>
+          <a:graphicData uri="http://schemas.openxmlformats.org/drawingml/2006/chart">
+            <c:chart xmlns:c="http://schemas.openxmlformats.org/drawingml/2006/chart" xmlns:r="http://schemas.openxmlformats.org/officeDocument/2006/relationships" r:id="rId2"/>
+          </a:graphicData>
+        </a:graphic>
+      </p:graphicFrame>
+      <p:sp>
+        <p:nvSpPr>
+          <p:cNvPr id="6" name="TextBox 5"/>
+          <p:cNvSpPr txBox="1"/>
+          <p:nvPr/>
+        </p:nvSpPr>
+        <p:spPr>
+          <a:xfrm>
+            <a:off x="533400" y="990600"/>
+            <a:ext cx="3505200" cy="369332"/>
+          </a:xfrm>
+          <a:prstGeom prst="rect">
+            <a:avLst/>
+          </a:prstGeom>
+          <a:noFill/>
+        </p:spPr>
+        <p:txBody>
+          <a:bodyPr wrap="square" rtlCol="0">
+            <a:spAutoFit/>
+          </a:bodyPr>
+          <a:lstStyle/>
+          <a:p>
+            <a:r>
+              <a:rPr lang="ro-RO" b="1" u="sng" dirty="0" smtClean="0"/>
+              <a:t>Max=10^8</a:t>
+            </a:r>
+          </a:p>
+        </p:txBody>
+      </p:sp>
+    </p:spTree>
+  </p:cSld>
+  <p:clrMapOvr>
+    <a:masterClrMapping/>
+  </p:clrMapOvr>
+</p:sld>
+</file>
+
+<file path=ppt/slides/slide17.xml><?xml version="1.0" encoding="utf-8"?>
+<p:sld xmlns:a="http://schemas.openxmlformats.org/drawingml/2006/main" xmlns:r="http://schemas.openxmlformats.org/officeDocument/2006/relationships" xmlns:p="http://schemas.openxmlformats.org/presentationml/2006/main">
+  <p:cSld>
+    <p:spTree>
+      <p:nvGrpSpPr>
+        <p:cNvPr id="1" name=""/>
+        <p:cNvGrpSpPr/>
+        <p:nvPr/>
+      </p:nvGrpSpPr>
+      <p:grpSpPr>
+        <a:xfrm>
+          <a:off x="0" y="0"/>
+          <a:ext cx="0" cy="0"/>
+          <a:chOff x="0" y="0"/>
+          <a:chExt cx="0" cy="0"/>
+        </a:xfrm>
+      </p:grpSpPr>
+      <p:sp>
+        <p:nvSpPr>
+          <p:cNvPr id="2" name="Title 1"/>
+          <p:cNvSpPr>
+            <a:spLocks noGrp="1"/>
+          </p:cNvSpPr>
+          <p:nvPr>
+            <p:ph type="title"/>
+          </p:nvPr>
+        </p:nvSpPr>
+        <p:spPr>
+          <a:xfrm>
+            <a:off x="381000" y="0"/>
+            <a:ext cx="8229600" cy="1143000"/>
+          </a:xfrm>
+        </p:spPr>
+        <p:txBody>
+          <a:bodyPr>
+            <a:normAutofit fontScale="90000"/>
+          </a:bodyPr>
+          <a:lstStyle/>
+          <a:p>
+            <a:r>
+              <a:rPr lang="ro-RO" sz="3600" b="1" dirty="0" smtClean="0"/>
+              <a:t>Quick Sort</a:t>
+            </a:r>
+            <a:r>
+              <a:rPr lang="en-US" sz="3600" dirty="0" smtClean="0"/>
+              <a:t/>
+            </a:r>
+            <a:br>
+              <a:rPr lang="en-US" sz="3600" dirty="0" smtClean="0"/>
+            </a:br>
+            <a:r>
+              <a:rPr lang="en-US" sz="3600" dirty="0" err="1" smtClean="0"/>
+              <a:t>Rulare</a:t>
+            </a:r>
+            <a:r>
+              <a:rPr lang="en-US" sz="3600" dirty="0" smtClean="0"/>
+              <a:t> </a:t>
+            </a:r>
+            <a:r>
+              <a:rPr lang="en-US" sz="3600" dirty="0" err="1" smtClean="0"/>
+              <a:t>comparativ</a:t>
+            </a:r>
+            <a:r>
+              <a:rPr lang="ro-RO" sz="3600" dirty="0" smtClean="0"/>
+              <a:t>ă</a:t>
+            </a:r>
+            <a:endParaRPr lang="en-US" sz="3600" dirty="0"/>
+          </a:p>
+        </p:txBody>
+      </p:sp>
+      <p:graphicFrame>
+        <p:nvGraphicFramePr>
+          <p:cNvPr id="4" name="Content Placeholder 3"/>
+          <p:cNvGraphicFramePr>
+            <a:graphicFrameLocks noGrp="1"/>
+          </p:cNvGraphicFramePr>
+          <p:nvPr>
+            <p:ph idx="1"/>
+          </p:nvPr>
+        </p:nvGraphicFramePr>
+        <p:xfrm>
+          <a:off x="457200" y="1600200"/>
+          <a:ext cx="8229600" cy="4525963"/>
+        </p:xfrm>
+        <a:graphic>
+          <a:graphicData uri="http://schemas.openxmlformats.org/drawingml/2006/chart">
+            <c:chart xmlns:c="http://schemas.openxmlformats.org/drawingml/2006/chart" xmlns:r="http://schemas.openxmlformats.org/officeDocument/2006/relationships" r:id="rId2"/>
+          </a:graphicData>
+        </a:graphic>
+      </p:graphicFrame>
+      <p:sp>
+        <p:nvSpPr>
+          <p:cNvPr id="6" name="TextBox 5"/>
+          <p:cNvSpPr txBox="1"/>
+          <p:nvPr/>
+        </p:nvSpPr>
+        <p:spPr>
+          <a:xfrm>
+            <a:off x="533400" y="990600"/>
+            <a:ext cx="3505200" cy="369332"/>
+          </a:xfrm>
+          <a:prstGeom prst="rect">
+            <a:avLst/>
+          </a:prstGeom>
+          <a:noFill/>
+        </p:spPr>
+        <p:txBody>
+          <a:bodyPr wrap="square" rtlCol="0">
+            <a:spAutoFit/>
+          </a:bodyPr>
+          <a:lstStyle/>
+          <a:p>
+            <a:r>
+              <a:rPr lang="ro-RO" b="1" u="sng" dirty="0" smtClean="0"/>
+              <a:t>Max=10^8</a:t>
+            </a:r>
+          </a:p>
+        </p:txBody>
+      </p:sp>
+    </p:spTree>
+  </p:cSld>
+  <p:clrMapOvr>
+    <a:masterClrMapping/>
+  </p:clrMapOvr>
+</p:sld>
+</file>
+
+<file path=ppt/slides/slide18.xml><?xml version="1.0" encoding="utf-8"?>
+<p:sld xmlns:a="http://schemas.openxmlformats.org/drawingml/2006/main" xmlns:r="http://schemas.openxmlformats.org/officeDocument/2006/relationships" xmlns:p="http://schemas.openxmlformats.org/presentationml/2006/main">
+  <p:cSld>
+    <p:spTree>
+      <p:nvGrpSpPr>
+        <p:cNvPr id="1" name=""/>
+        <p:cNvGrpSpPr/>
+        <p:nvPr/>
+      </p:nvGrpSpPr>
+      <p:grpSpPr>
+        <a:xfrm>
+          <a:off x="0" y="0"/>
+          <a:ext cx="0" cy="0"/>
+          <a:chOff x="0" y="0"/>
+          <a:chExt cx="0" cy="0"/>
+        </a:xfrm>
+      </p:grpSpPr>
+      <p:sp>
+        <p:nvSpPr>
+          <p:cNvPr id="2" name="Title 1"/>
+          <p:cNvSpPr>
+            <a:spLocks noGrp="1"/>
+          </p:cNvSpPr>
+          <p:nvPr>
+            <p:ph type="title"/>
+          </p:nvPr>
+        </p:nvSpPr>
+        <p:spPr>
+          <a:xfrm>
+            <a:off x="381000" y="0"/>
+            <a:ext cx="8229600" cy="1143000"/>
+          </a:xfrm>
+        </p:spPr>
+        <p:txBody>
+          <a:bodyPr>
+            <a:normAutofit fontScale="90000"/>
+          </a:bodyPr>
+          <a:lstStyle/>
+          <a:p>
+            <a:r>
+              <a:rPr lang="ro-RO" sz="3600" b="1" dirty="0" smtClean="0"/>
+              <a:t>Quick Sort</a:t>
+            </a:r>
+            <a:r>
+              <a:rPr lang="en-US" sz="3600" dirty="0" smtClean="0"/>
+              <a:t/>
+            </a:r>
+            <a:br>
+              <a:rPr lang="en-US" sz="3600" dirty="0" smtClean="0"/>
+            </a:br>
+            <a:r>
+              <a:rPr lang="en-US" sz="3600" dirty="0" err="1" smtClean="0"/>
+              <a:t>Rulare</a:t>
+            </a:r>
+            <a:r>
+              <a:rPr lang="en-US" sz="3600" dirty="0" smtClean="0"/>
+              <a:t> </a:t>
+            </a:r>
+            <a:r>
+              <a:rPr lang="en-US" sz="3600" dirty="0" err="1" smtClean="0"/>
+              <a:t>comparativ</a:t>
+            </a:r>
+            <a:r>
+              <a:rPr lang="ro-RO" sz="3600" dirty="0" smtClean="0"/>
+              <a:t>ă</a:t>
+            </a:r>
+            <a:endParaRPr lang="en-US" sz="3600" dirty="0"/>
+          </a:p>
+        </p:txBody>
+      </p:sp>
+      <p:graphicFrame>
+        <p:nvGraphicFramePr>
+          <p:cNvPr id="4" name="Content Placeholder 3"/>
+          <p:cNvGraphicFramePr>
+            <a:graphicFrameLocks noGrp="1"/>
+          </p:cNvGraphicFramePr>
+          <p:nvPr>
+            <p:ph idx="1"/>
+          </p:nvPr>
+        </p:nvGraphicFramePr>
+        <p:xfrm>
+          <a:off x="457200" y="1600200"/>
+          <a:ext cx="8229600" cy="4525963"/>
+        </p:xfrm>
+        <a:graphic>
+          <a:graphicData uri="http://schemas.openxmlformats.org/drawingml/2006/chart">
+            <c:chart xmlns:c="http://schemas.openxmlformats.org/drawingml/2006/chart" xmlns:r="http://schemas.openxmlformats.org/officeDocument/2006/relationships" r:id="rId2"/>
+          </a:graphicData>
+        </a:graphic>
+      </p:graphicFrame>
+      <p:sp>
+        <p:nvSpPr>
+          <p:cNvPr id="6" name="TextBox 5"/>
+          <p:cNvSpPr txBox="1"/>
+          <p:nvPr/>
+        </p:nvSpPr>
+        <p:spPr>
+          <a:xfrm>
+            <a:off x="533400" y="990600"/>
+            <a:ext cx="3505200" cy="369332"/>
+          </a:xfrm>
+          <a:prstGeom prst="rect">
+            <a:avLst/>
+          </a:prstGeom>
+          <a:noFill/>
+        </p:spPr>
+        <p:txBody>
+          <a:bodyPr wrap="square" rtlCol="0">
+            <a:spAutoFit/>
+          </a:bodyPr>
+          <a:lstStyle/>
+          <a:p>
+            <a:r>
+              <a:rPr lang="ro-RO" b="1" u="sng" dirty="0" smtClean="0"/>
+              <a:t>Max=10^8</a:t>
+            </a:r>
           </a:p>
         </p:txBody>
       </p:sp>
@@ -6521,7 +9582,7 @@
         </p:xfrm>
         <a:graphic>
           <a:graphicData uri="http://schemas.openxmlformats.org/drawingml/2006/chart">
-            <c:chart xmlns:c="http://schemas.openxmlformats.org/drawingml/2006/chart" xmlns:r="http://schemas.openxmlformats.org/officeDocument/2006/relationships" r:id="rId2"/>
+            <c:chart xmlns:c="http://schemas.openxmlformats.org/drawingml/2006/chart" xmlns:r="http://schemas.openxmlformats.org/officeDocument/2006/relationships" r:id="rId3"/>
           </a:graphicData>
         </a:graphic>
       </p:graphicFrame>
@@ -6556,6 +9617,57 @@
               <a:t>6</a:t>
             </a:r>
             <a:endParaRPr lang="ro-RO" b="1" u="sng" dirty="0" smtClean="0"/>
+          </a:p>
+        </p:txBody>
+      </p:sp>
+      <p:sp>
+        <p:nvSpPr>
+          <p:cNvPr id="9" name="TextBox 8"/>
+          <p:cNvSpPr txBox="1"/>
+          <p:nvPr/>
+        </p:nvSpPr>
+        <p:spPr>
+          <a:xfrm>
+            <a:off x="838200" y="6211669"/>
+            <a:ext cx="7696200" cy="923330"/>
+          </a:xfrm>
+          <a:prstGeom prst="rect">
+            <a:avLst/>
+          </a:prstGeom>
+          <a:noFill/>
+        </p:spPr>
+        <p:txBody>
+          <a:bodyPr wrap="square" rtlCol="0">
+            <a:spAutoFit/>
+          </a:bodyPr>
+          <a:lstStyle/>
+          <a:p>
+            <a:pPr>
+              <a:buFont typeface="Arial" pitchFamily="34" charset="0"/>
+              <a:buChar char="•"/>
+            </a:pPr>
+            <a:r>
+              <a:rPr lang="ro-RO" b="1" dirty="0" smtClean="0"/>
+              <a:t>Shell Sort se descurca super</a:t>
+            </a:r>
+            <a:r>
+              <a:rPr lang="ro-RO" b="1" baseline="0" dirty="0" smtClean="0"/>
+              <a:t> bine cand e vorba de vectori aproape sortati.</a:t>
+            </a:r>
+          </a:p>
+          <a:p>
+            <a:pPr>
+              <a:buFont typeface="Arial" pitchFamily="34" charset="0"/>
+              <a:buChar char="•"/>
+            </a:pPr>
+            <a:r>
+              <a:rPr lang="ro-RO" b="1" dirty="0" smtClean="0"/>
+              <a:t>La Merge Sort și Heap Sort timpii nu prea depind de forma inputului .</a:t>
+            </a:r>
+            <a:endParaRPr lang="en-US" b="1" dirty="0" smtClean="0"/>
+          </a:p>
+          <a:p>
+            <a:endParaRPr lang="en-US" dirty="0"/>
           </a:p>
         </p:txBody>
       </p:sp>
@@ -6625,7 +9737,7 @@
           </p:nvPr>
         </p:nvGraphicFramePr>
         <p:xfrm>
-          <a:off x="457200" y="1600200"/>
+          <a:off x="533400" y="1295400"/>
           <a:ext cx="8229600" cy="4525963"/>
         </p:xfrm>
         <a:graphic>
@@ -6665,6 +9777,67 @@
               <a:t>6</a:t>
             </a:r>
             <a:endParaRPr lang="ro-RO" b="1" u="sng" dirty="0" smtClean="0"/>
+          </a:p>
+        </p:txBody>
+      </p:sp>
+      <p:sp>
+        <p:nvSpPr>
+          <p:cNvPr id="6" name="TextBox 5"/>
+          <p:cNvSpPr txBox="1"/>
+          <p:nvPr/>
+        </p:nvSpPr>
+        <p:spPr>
+          <a:xfrm>
+            <a:off x="685800" y="5562600"/>
+            <a:ext cx="7696200" cy="1477328"/>
+          </a:xfrm>
+          <a:prstGeom prst="rect">
+            <a:avLst/>
+          </a:prstGeom>
+          <a:noFill/>
+        </p:spPr>
+        <p:txBody>
+          <a:bodyPr wrap="square" rtlCol="0">
+            <a:spAutoFit/>
+          </a:bodyPr>
+          <a:lstStyle/>
+          <a:p>
+            <a:pPr>
+              <a:buFont typeface="Arial" pitchFamily="34" charset="0"/>
+              <a:buChar char="•"/>
+            </a:pPr>
+            <a:r>
+              <a:rPr lang="ro-RO" b="1" dirty="0" smtClean="0"/>
+              <a:t>Shell Sort se descurca super</a:t>
+            </a:r>
+            <a:r>
+              <a:rPr lang="ro-RO" b="1" baseline="0" dirty="0" smtClean="0"/>
+              <a:t> bine cand e vorba de vectori aproape sortati.</a:t>
+            </a:r>
+          </a:p>
+          <a:p>
+            <a:pPr>
+              <a:buFont typeface="Arial" pitchFamily="34" charset="0"/>
+              <a:buChar char="•"/>
+            </a:pPr>
+            <a:r>
+              <a:rPr lang="ro-RO" b="1" dirty="0" smtClean="0"/>
+              <a:t>Chiar mai bine decât Quick Sort !</a:t>
+            </a:r>
+          </a:p>
+          <a:p>
+            <a:pPr>
+              <a:buFont typeface="Arial" pitchFamily="34" charset="0"/>
+              <a:buChar char="•"/>
+            </a:pPr>
+            <a:r>
+              <a:rPr lang="ro-RO" b="1" dirty="0" smtClean="0"/>
+              <a:t>La vectori sortati descrescători- varianta cu gap seq generat prin formula 3k+1 are timp similar cu Quick Sort la vectorul sortat descrescător.</a:t>
+            </a:r>
+            <a:endParaRPr lang="en-US" b="1" dirty="0" smtClean="0"/>
+          </a:p>
+          <a:p>
+            <a:endParaRPr lang="en-US" dirty="0"/>
           </a:p>
         </p:txBody>
       </p:sp>
@@ -6777,6 +9950,49 @@
           </a:p>
         </p:txBody>
       </p:sp>
+      <p:sp>
+        <p:nvSpPr>
+          <p:cNvPr id="7" name="Rectangle 6"/>
+          <p:cNvSpPr/>
+          <p:nvPr/>
+        </p:nvSpPr>
+        <p:spPr>
+          <a:xfrm>
+            <a:off x="609600" y="5791200"/>
+            <a:ext cx="5657703" cy="646331"/>
+          </a:xfrm>
+          <a:prstGeom prst="rect">
+            <a:avLst/>
+          </a:prstGeom>
+        </p:spPr>
+        <p:txBody>
+          <a:bodyPr wrap="none">
+            <a:spAutoFit/>
+          </a:bodyPr>
+          <a:lstStyle/>
+          <a:p>
+            <a:pPr>
+              <a:buFont typeface="Arial" pitchFamily="34" charset="0"/>
+              <a:buChar char="•"/>
+            </a:pPr>
+            <a:r>
+              <a:rPr lang="ro-RO" b="1" dirty="0" smtClean="0"/>
+              <a:t> Merge Sort și Quick Sort par a avea timpi similari.</a:t>
+            </a:r>
+          </a:p>
+          <a:p>
+            <a:pPr>
+              <a:buFont typeface="Arial" pitchFamily="34" charset="0"/>
+              <a:buChar char="•"/>
+            </a:pPr>
+            <a:r>
+              <a:rPr lang="ro-RO" b="1" dirty="0" smtClean="0"/>
+              <a:t> Heap Sort  pare a avea timpi mai mari în toate situațiile.</a:t>
+            </a:r>
+            <a:endParaRPr lang="en-US" b="1" dirty="0"/>
+          </a:p>
+        </p:txBody>
+      </p:sp>
     </p:spTree>
   </p:cSld>
   <p:clrMapOvr>
@@ -6786,7 +10002,7 @@
 </file>
 
 <file path=ppt/slides/slide6.xml><?xml version="1.0" encoding="utf-8"?>
-<p:sld xmlns:a="http://schemas.openxmlformats.org/drawingml/2006/main" xmlns:r="http://schemas.openxmlformats.org/officeDocument/2006/relationships" xmlns:p="http://schemas.openxmlformats.org/presentationml/2006/main">
+<p:sld xmlns:a="http://schemas.openxmlformats.org/drawingml/2006/main" xmlns:r="http://schemas.openxmlformats.org/officeDocument/2006/relationships" xmlns:p="http://schemas.openxmlformats.org/presentationml/2006/main" show="0">
   <p:cSld>
     <p:spTree>
       <p:nvGrpSpPr>
@@ -6951,11 +10167,12 @@
   <p:clrMapOvr>
     <a:masterClrMapping/>
   </p:clrMapOvr>
+  <p:transition/>
 </p:sld>
 </file>
 
 <file path=ppt/slides/slide7.xml><?xml version="1.0" encoding="utf-8"?>
-<p:sld xmlns:a="http://schemas.openxmlformats.org/drawingml/2006/main" xmlns:r="http://schemas.openxmlformats.org/officeDocument/2006/relationships" xmlns:p="http://schemas.openxmlformats.org/presentationml/2006/main">
+<p:sld xmlns:a="http://schemas.openxmlformats.org/drawingml/2006/main" xmlns:r="http://schemas.openxmlformats.org/officeDocument/2006/relationships" xmlns:p="http://schemas.openxmlformats.org/presentationml/2006/main" show="0">
   <p:cSld>
     <p:spTree>
       <p:nvGrpSpPr>
@@ -7120,6 +10337,7 @@
   <p:clrMapOvr>
     <a:masterClrMapping/>
   </p:clrMapOvr>
+  <p:transition/>
 </p:sld>
 </file>
 
@@ -7158,6 +10376,233 @@
         </p:spPr>
         <p:txBody>
           <a:bodyPr>
+            <a:normAutofit/>
+          </a:bodyPr>
+          <a:lstStyle/>
+          <a:p>
+            <a:r>
+              <a:rPr lang="en-US" sz="2800" dirty="0" err="1" smtClean="0"/>
+              <a:t>Rulare</a:t>
+            </a:r>
+            <a:r>
+              <a:rPr lang="en-US" sz="2800" dirty="0" smtClean="0"/>
+              <a:t> </a:t>
+            </a:r>
+            <a:r>
+              <a:rPr lang="en-US" sz="2800" dirty="0" err="1" smtClean="0"/>
+              <a:t>comparativa</a:t>
+            </a:r>
+            <a:r>
+              <a:rPr lang="en-US" sz="2800" dirty="0" smtClean="0"/>
+              <a:t> input </a:t>
+            </a:r>
+            <a:r>
+              <a:rPr lang="en-US" sz="2800" dirty="0" err="1" smtClean="0"/>
+              <a:t>aleatoriu</a:t>
+            </a:r>
+            <a:r>
+              <a:rPr lang="en-US" sz="2800" dirty="0" smtClean="0"/>
+              <a:t> – </a:t>
+            </a:r>
+            <a:r>
+              <a:rPr lang="en-US" sz="2800" dirty="0" err="1" smtClean="0"/>
+              <a:t>variatia</a:t>
+            </a:r>
+            <a:r>
+              <a:rPr lang="en-US" sz="2800" dirty="0" smtClean="0"/>
+              <a:t> </a:t>
+            </a:r>
+            <a:r>
+              <a:rPr lang="en-US" sz="2800" dirty="0" err="1" smtClean="0"/>
+              <a:t>timpului</a:t>
+            </a:r>
+            <a:r>
+              <a:rPr lang="ro-RO" sz="2800" dirty="0" smtClean="0"/>
+              <a:t> de rulare</a:t>
+            </a:r>
+            <a:r>
+              <a:rPr lang="en-US" sz="2800" dirty="0" smtClean="0"/>
+              <a:t> cu </a:t>
+            </a:r>
+            <a:r>
+              <a:rPr lang="en-US" sz="2800" dirty="0" err="1" smtClean="0"/>
+              <a:t>cresterea</a:t>
+            </a:r>
+            <a:r>
+              <a:rPr lang="en-US" sz="2800" dirty="0" smtClean="0"/>
+              <a:t> </a:t>
+            </a:r>
+            <a:r>
+              <a:rPr lang="en-US" sz="2800" dirty="0" err="1" smtClean="0"/>
+              <a:t>numarului</a:t>
+            </a:r>
+            <a:r>
+              <a:rPr lang="en-US" sz="2800" dirty="0" smtClean="0"/>
+              <a:t> de </a:t>
+            </a:r>
+            <a:r>
+              <a:rPr lang="en-US" sz="2800" dirty="0" err="1" smtClean="0"/>
+              <a:t>elemente</a:t>
+            </a:r>
+            <a:endParaRPr lang="en-US" sz="2800" dirty="0"/>
+          </a:p>
+        </p:txBody>
+      </p:sp>
+      <p:graphicFrame>
+        <p:nvGraphicFramePr>
+          <p:cNvPr id="4" name="Content Placeholder 3"/>
+          <p:cNvGraphicFramePr>
+            <a:graphicFrameLocks noGrp="1"/>
+          </p:cNvGraphicFramePr>
+          <p:nvPr>
+            <p:ph idx="1"/>
+          </p:nvPr>
+        </p:nvGraphicFramePr>
+        <p:xfrm>
+          <a:off x="457200" y="1371600"/>
+          <a:ext cx="8382000" cy="4191000"/>
+        </p:xfrm>
+        <a:graphic>
+          <a:graphicData uri="http://schemas.openxmlformats.org/drawingml/2006/chart">
+            <c:chart xmlns:c="http://schemas.openxmlformats.org/drawingml/2006/chart" xmlns:r="http://schemas.openxmlformats.org/officeDocument/2006/relationships" r:id="rId2"/>
+          </a:graphicData>
+        </a:graphic>
+      </p:graphicFrame>
+      <p:sp>
+        <p:nvSpPr>
+          <p:cNvPr id="5" name="TextBox 4"/>
+          <p:cNvSpPr txBox="1"/>
+          <p:nvPr/>
+        </p:nvSpPr>
+        <p:spPr>
+          <a:xfrm>
+            <a:off x="533400" y="990600"/>
+            <a:ext cx="3505200" cy="369332"/>
+          </a:xfrm>
+          <a:prstGeom prst="rect">
+            <a:avLst/>
+          </a:prstGeom>
+          <a:noFill/>
+        </p:spPr>
+        <p:txBody>
+          <a:bodyPr wrap="square" rtlCol="0">
+            <a:spAutoFit/>
+          </a:bodyPr>
+          <a:lstStyle/>
+          <a:p>
+            <a:r>
+              <a:rPr lang="en-US" b="1" u="sng" dirty="0" smtClean="0"/>
+              <a:t>MAX =</a:t>
+            </a:r>
+            <a:r>
+              <a:rPr lang="ro-RO" b="1" u="sng" dirty="0" smtClean="0"/>
+              <a:t>10</a:t>
+            </a:r>
+            <a:r>
+              <a:rPr lang="en-US" b="1" u="sng" baseline="30000" dirty="0" smtClean="0"/>
+              <a:t>8</a:t>
+            </a:r>
+            <a:endParaRPr lang="ro-RO" b="1" u="sng" dirty="0" smtClean="0"/>
+          </a:p>
+        </p:txBody>
+      </p:sp>
+      <p:sp>
+        <p:nvSpPr>
+          <p:cNvPr id="6" name="Rectangle 5"/>
+          <p:cNvSpPr/>
+          <p:nvPr/>
+        </p:nvSpPr>
+        <p:spPr>
+          <a:xfrm>
+            <a:off x="609600" y="5562600"/>
+            <a:ext cx="8305800" cy="1323439"/>
+          </a:xfrm>
+          <a:prstGeom prst="rect">
+            <a:avLst/>
+          </a:prstGeom>
+        </p:spPr>
+        <p:txBody>
+          <a:bodyPr wrap="square">
+            <a:spAutoFit/>
+          </a:bodyPr>
+          <a:lstStyle/>
+          <a:p>
+            <a:pPr>
+              <a:buFont typeface="Arial" pitchFamily="34" charset="0"/>
+              <a:buChar char="•"/>
+            </a:pPr>
+            <a:r>
+              <a:rPr lang="ro-RO" sz="1600" b="1" dirty="0" smtClean="0"/>
+              <a:t>Timpii pentru Quick Sort realizat prin alegerea pivotului cu mediana din 5 sunt similari cu cei pentru QS cu alegerea pivotului random. (diferențe nesemnificative la toare rulările)</a:t>
+            </a:r>
+          </a:p>
+          <a:p>
+            <a:pPr>
+              <a:buFont typeface="Arial" pitchFamily="34" charset="0"/>
+              <a:buChar char="•"/>
+            </a:pPr>
+            <a:r>
+              <a:rPr lang="ro-RO" sz="1600" b="1" dirty="0" smtClean="0"/>
+              <a:t>Radix Sort cu baza 2^16 e cel mai bun dintre cei 3 implementați , iar următorul e Radix Sort cu baza 2^10,  mai apoi  Radix Sort cu baza 2^12.</a:t>
+            </a:r>
+          </a:p>
+          <a:p>
+            <a:pPr>
+              <a:buFont typeface="Arial" pitchFamily="34" charset="0"/>
+              <a:buChar char="•"/>
+            </a:pPr>
+            <a:r>
+              <a:rPr lang="ro-RO" sz="1600" b="1" dirty="0" smtClean="0"/>
+              <a:t>Quick Sort merge mai rapid decât Merge Sort, posibil datorită accesării memoriei suplimentare </a:t>
+            </a:r>
+            <a:endParaRPr lang="en-US" sz="1600" b="1" dirty="0"/>
+          </a:p>
+        </p:txBody>
+      </p:sp>
+    </p:spTree>
+  </p:cSld>
+  <p:clrMapOvr>
+    <a:masterClrMapping/>
+  </p:clrMapOvr>
+  <p:transition/>
+</p:sld>
+</file>
+
+<file path=ppt/slides/slide9.xml><?xml version="1.0" encoding="utf-8"?>
+<p:sld xmlns:a="http://schemas.openxmlformats.org/drawingml/2006/main" xmlns:r="http://schemas.openxmlformats.org/officeDocument/2006/relationships" xmlns:p="http://schemas.openxmlformats.org/presentationml/2006/main" show="0">
+  <p:cSld>
+    <p:spTree>
+      <p:nvGrpSpPr>
+        <p:cNvPr id="1" name=""/>
+        <p:cNvGrpSpPr/>
+        <p:nvPr/>
+      </p:nvGrpSpPr>
+      <p:grpSpPr>
+        <a:xfrm>
+          <a:off x="0" y="0"/>
+          <a:ext cx="0" cy="0"/>
+          <a:chOff x="0" y="0"/>
+          <a:chExt cx="0" cy="0"/>
+        </a:xfrm>
+      </p:grpSpPr>
+      <p:sp>
+        <p:nvSpPr>
+          <p:cNvPr id="2" name="Title 1"/>
+          <p:cNvSpPr>
+            <a:spLocks noGrp="1"/>
+          </p:cNvSpPr>
+          <p:nvPr>
+            <p:ph type="title"/>
+          </p:nvPr>
+        </p:nvSpPr>
+        <p:spPr>
+          <a:xfrm>
+            <a:off x="381000" y="0"/>
+            <a:ext cx="8229600" cy="1143000"/>
+          </a:xfrm>
+        </p:spPr>
+        <p:txBody>
+          <a:bodyPr>
             <a:normAutofit fontScale="90000"/>
           </a:bodyPr>
           <a:lstStyle/>
@@ -7289,175 +10734,7 @@
   <p:clrMapOvr>
     <a:masterClrMapping/>
   </p:clrMapOvr>
-</p:sld>
-</file>
-
-<file path=ppt/slides/slide9.xml><?xml version="1.0" encoding="utf-8"?>
-<p:sld xmlns:a="http://schemas.openxmlformats.org/drawingml/2006/main" xmlns:r="http://schemas.openxmlformats.org/officeDocument/2006/relationships" xmlns:p="http://schemas.openxmlformats.org/presentationml/2006/main">
-  <p:cSld>
-    <p:spTree>
-      <p:nvGrpSpPr>
-        <p:cNvPr id="1" name=""/>
-        <p:cNvGrpSpPr/>
-        <p:nvPr/>
-      </p:nvGrpSpPr>
-      <p:grpSpPr>
-        <a:xfrm>
-          <a:off x="0" y="0"/>
-          <a:ext cx="0" cy="0"/>
-          <a:chOff x="0" y="0"/>
-          <a:chExt cx="0" cy="0"/>
-        </a:xfrm>
-      </p:grpSpPr>
-      <p:sp>
-        <p:nvSpPr>
-          <p:cNvPr id="2" name="Title 1"/>
-          <p:cNvSpPr>
-            <a:spLocks noGrp="1"/>
-          </p:cNvSpPr>
-          <p:nvPr>
-            <p:ph type="title"/>
-          </p:nvPr>
-        </p:nvSpPr>
-        <p:spPr>
-          <a:xfrm>
-            <a:off x="381000" y="0"/>
-            <a:ext cx="8229600" cy="1143000"/>
-          </a:xfrm>
-        </p:spPr>
-        <p:txBody>
-          <a:bodyPr>
-            <a:normAutofit fontScale="90000"/>
-          </a:bodyPr>
-          <a:lstStyle/>
-          <a:p>
-            <a:r>
-              <a:rPr lang="en-US" sz="3600" dirty="0" err="1" smtClean="0"/>
-              <a:t>Rulare</a:t>
-            </a:r>
-            <a:r>
-              <a:rPr lang="en-US" sz="3600" dirty="0" smtClean="0"/>
-              <a:t> </a:t>
-            </a:r>
-            <a:r>
-              <a:rPr lang="en-US" sz="3600" dirty="0" err="1" smtClean="0"/>
-              <a:t>comparativa</a:t>
-            </a:r>
-            <a:r>
-              <a:rPr lang="en-US" sz="3600" dirty="0" smtClean="0"/>
-              <a:t> input </a:t>
-            </a:r>
-            <a:r>
-              <a:rPr lang="en-US" sz="3600" dirty="0" err="1" smtClean="0"/>
-              <a:t>aleatoriu</a:t>
-            </a:r>
-            <a:r>
-              <a:rPr lang="en-US" sz="3600" dirty="0" smtClean="0"/>
-              <a:t> – </a:t>
-            </a:r>
-            <a:r>
-              <a:rPr lang="en-US" sz="3600" dirty="0" err="1" smtClean="0"/>
-              <a:t>variatia</a:t>
-            </a:r>
-            <a:r>
-              <a:rPr lang="en-US" sz="3600" dirty="0" smtClean="0"/>
-              <a:t> </a:t>
-            </a:r>
-            <a:r>
-              <a:rPr lang="en-US" sz="3600" dirty="0" err="1" smtClean="0"/>
-              <a:t>timpului</a:t>
-            </a:r>
-            <a:r>
-              <a:rPr lang="en-US" sz="3600" dirty="0" smtClean="0"/>
-              <a:t> cu </a:t>
-            </a:r>
-            <a:r>
-              <a:rPr lang="en-US" sz="3600" dirty="0" err="1" smtClean="0"/>
-              <a:t>cresterea</a:t>
-            </a:r>
-            <a:r>
-              <a:rPr lang="en-US" sz="3600" dirty="0" smtClean="0"/>
-              <a:t> </a:t>
-            </a:r>
-            <a:r>
-              <a:rPr lang="en-US" sz="3600" dirty="0" err="1" smtClean="0"/>
-              <a:t>numarului</a:t>
-            </a:r>
-            <a:r>
-              <a:rPr lang="en-US" sz="3600" dirty="0" smtClean="0"/>
-              <a:t> de </a:t>
-            </a:r>
-            <a:r>
-              <a:rPr lang="en-US" sz="3600" dirty="0" err="1" smtClean="0"/>
-              <a:t>elemente</a:t>
-            </a:r>
-            <a:endParaRPr lang="en-US" sz="3600" dirty="0"/>
-          </a:p>
-        </p:txBody>
-      </p:sp>
-      <p:graphicFrame>
-        <p:nvGraphicFramePr>
-          <p:cNvPr id="4" name="Content Placeholder 3"/>
-          <p:cNvGraphicFramePr>
-            <a:graphicFrameLocks noGrp="1"/>
-          </p:cNvGraphicFramePr>
-          <p:nvPr>
-            <p:ph idx="1"/>
-          </p:nvPr>
-        </p:nvGraphicFramePr>
-        <p:xfrm>
-          <a:off x="457200" y="1600200"/>
-          <a:ext cx="8229600" cy="4525963"/>
-        </p:xfrm>
-        <a:graphic>
-          <a:graphicData uri="http://schemas.openxmlformats.org/drawingml/2006/chart">
-            <c:chart xmlns:c="http://schemas.openxmlformats.org/drawingml/2006/chart" xmlns:r="http://schemas.openxmlformats.org/officeDocument/2006/relationships" r:id="rId2"/>
-          </a:graphicData>
-        </a:graphic>
-      </p:graphicFrame>
-      <p:sp>
-        <p:nvSpPr>
-          <p:cNvPr id="5" name="TextBox 4"/>
-          <p:cNvSpPr txBox="1"/>
-          <p:nvPr/>
-        </p:nvSpPr>
-        <p:spPr>
-          <a:xfrm>
-            <a:off x="533400" y="990600"/>
-            <a:ext cx="3505200" cy="369332"/>
-          </a:xfrm>
-          <a:prstGeom prst="rect">
-            <a:avLst/>
-          </a:prstGeom>
-          <a:noFill/>
-        </p:spPr>
-        <p:txBody>
-          <a:bodyPr wrap="square" rtlCol="0">
-            <a:spAutoFit/>
-          </a:bodyPr>
-          <a:lstStyle/>
-          <a:p>
-            <a:r>
-              <a:rPr lang="en-US" b="1" u="sng" dirty="0" smtClean="0"/>
-              <a:t>MAX =</a:t>
-            </a:r>
-            <a:r>
-              <a:rPr lang="ro-RO" b="1" u="sng" dirty="0" smtClean="0"/>
-              <a:t>10</a:t>
-            </a:r>
-            <a:r>
-              <a:rPr lang="en-US" b="1" u="sng" baseline="30000" dirty="0" smtClean="0"/>
-              <a:t>8</a:t>
-            </a:r>
-            <a:endParaRPr lang="ro-RO" b="1" u="sng" dirty="0" smtClean="0"/>
-          </a:p>
-        </p:txBody>
-      </p:sp>
-    </p:spTree>
-  </p:cSld>
-  <p:clrMapOvr>
-    <a:masterClrMapping/>
-  </p:clrMapOvr>
+  <p:transition/>
 </p:sld>
 </file>
 

</xml_diff>

<commit_message>
added little details to last charts
</commit_message>
<xml_diff>
--- a/Analiză comparativă sortări.pptx
+++ b/Analiză comparativă sortări.pptx
@@ -9399,6 +9399,69 @@
               <a:rPr lang="ro-RO" b="1" u="sng" dirty="0" smtClean="0"/>
               <a:t>Max=10^8</a:t>
             </a:r>
+          </a:p>
+        </p:txBody>
+      </p:sp>
+      <p:sp>
+        <p:nvSpPr>
+          <p:cNvPr id="5" name="Rectangle 4"/>
+          <p:cNvSpPr/>
+          <p:nvPr/>
+        </p:nvSpPr>
+        <p:spPr>
+          <a:xfrm>
+            <a:off x="228600" y="5934670"/>
+            <a:ext cx="8763000" cy="923330"/>
+          </a:xfrm>
+          <a:prstGeom prst="rect">
+            <a:avLst/>
+          </a:prstGeom>
+        </p:spPr>
+        <p:txBody>
+          <a:bodyPr wrap="square">
+            <a:spAutoFit/>
+          </a:bodyPr>
+          <a:lstStyle/>
+          <a:p>
+            <a:pPr>
+              <a:buFont typeface="Arial" pitchFamily="34" charset="0"/>
+              <a:buChar char="•"/>
+            </a:pPr>
+            <a:r>
+              <a:rPr lang="ro-RO" b="1" dirty="0" smtClean="0"/>
+              <a:t> </a:t>
+            </a:r>
+            <a:r>
+              <a:rPr lang="en-US" b="1" dirty="0" err="1" smtClean="0"/>
+              <a:t>Timpi</a:t>
+            </a:r>
+            <a:r>
+              <a:rPr lang="en-US" b="1" dirty="0" smtClean="0"/>
+              <a:t> </a:t>
+            </a:r>
+            <a:r>
+              <a:rPr lang="en-US" b="1" dirty="0" err="1" smtClean="0"/>
+              <a:t>asem</a:t>
+            </a:r>
+            <a:r>
+              <a:rPr lang="ro-RO" b="1" dirty="0" smtClean="0"/>
+              <a:t>ănători pentru cele trei algoritmi de QuickSort </a:t>
+            </a:r>
+          </a:p>
+          <a:p>
+            <a:pPr>
+              <a:buFont typeface="Arial" pitchFamily="34" charset="0"/>
+              <a:buChar char="•"/>
+            </a:pPr>
+            <a:r>
+              <a:rPr lang="ro-RO" b="1" dirty="0"/>
+              <a:t> </a:t>
+            </a:r>
+            <a:r>
+              <a:rPr lang="ro-RO" b="1" dirty="0" smtClean="0"/>
+              <a:t>Mediana medianelor se pare că ia cel mai mult timp dintre cele 3 metode – la input de 10^7 elemente</a:t>
+            </a:r>
+            <a:endParaRPr lang="en-US" b="1" dirty="0"/>
           </a:p>
         </p:txBody>
       </p:sp>

</xml_diff>